<commit_message>
oliver sucks at making images
</commit_message>
<xml_diff>
--- a/Phase 2 Hand-in/4900 Presentation Group 9.pptx
+++ b/Phase 2 Hand-in/4900 Presentation Group 9.pptx
@@ -5,7 +5,7 @@
     <p:sldMasterId id="2147483648" r:id="rId1"/>
   </p:sldMasterIdLst>
   <p:notesMasterIdLst>
-    <p:notesMasterId r:id="rId16"/>
+    <p:notesMasterId r:id="rId19"/>
   </p:notesMasterIdLst>
   <p:sldIdLst>
     <p:sldId id="256" r:id="rId2"/>
@@ -13,15 +13,18 @@
     <p:sldId id="260" r:id="rId4"/>
     <p:sldId id="269" r:id="rId5"/>
     <p:sldId id="268" r:id="rId6"/>
-    <p:sldId id="265" r:id="rId7"/>
-    <p:sldId id="272" r:id="rId8"/>
-    <p:sldId id="264" r:id="rId9"/>
-    <p:sldId id="267" r:id="rId10"/>
-    <p:sldId id="266" r:id="rId11"/>
-    <p:sldId id="270" r:id="rId12"/>
-    <p:sldId id="271" r:id="rId13"/>
-    <p:sldId id="273" r:id="rId14"/>
-    <p:sldId id="263" r:id="rId15"/>
+    <p:sldId id="272" r:id="rId7"/>
+    <p:sldId id="276" r:id="rId8"/>
+    <p:sldId id="275" r:id="rId9"/>
+    <p:sldId id="265" r:id="rId10"/>
+    <p:sldId id="264" r:id="rId11"/>
+    <p:sldId id="267" r:id="rId12"/>
+    <p:sldId id="266" r:id="rId13"/>
+    <p:sldId id="274" r:id="rId14"/>
+    <p:sldId id="270" r:id="rId15"/>
+    <p:sldId id="271" r:id="rId16"/>
+    <p:sldId id="273" r:id="rId17"/>
+    <p:sldId id="263" r:id="rId18"/>
   </p:sldIdLst>
   <p:sldSz cx="12192000" cy="6858000"/>
   <p:notesSz cx="6858000" cy="9144000"/>
@@ -1658,6 +1661,344 @@
 </c:chartSpace>
 </file>
 
+<file path=ppt/charts/chart5.xml><?xml version="1.0" encoding="utf-8"?>
+<c:chartSpace xmlns:c="http://schemas.openxmlformats.org/drawingml/2006/chart" xmlns:a="http://schemas.openxmlformats.org/drawingml/2006/main" xmlns:r="http://schemas.openxmlformats.org/officeDocument/2006/relationships" xmlns:c16r2="http://schemas.microsoft.com/office/drawing/2015/06/chart">
+  <c:date1904 val="0"/>
+  <c:lang val="en-US"/>
+  <c:roundedCorners val="0"/>
+  <mc:AlternateContent xmlns:mc="http://schemas.openxmlformats.org/markup-compatibility/2006">
+    <mc:Choice xmlns:c14="http://schemas.microsoft.com/office/drawing/2007/8/2/chart" Requires="c14">
+      <c14:style val="102"/>
+    </mc:Choice>
+    <mc:Fallback>
+      <c:style val="2"/>
+    </mc:Fallback>
+  </mc:AlternateContent>
+  <c:chart>
+    <c:autoTitleDeleted val="1"/>
+    <c:view3D>
+      <c:rotX val="15"/>
+      <c:rotY val="20"/>
+      <c:depthPercent val="100"/>
+      <c:rAngAx val="1"/>
+    </c:view3D>
+    <c:floor>
+      <c:thickness val="0"/>
+      <c:spPr>
+        <a:noFill/>
+        <a:ln>
+          <a:noFill/>
+        </a:ln>
+        <a:effectLst/>
+        <a:sp3d/>
+      </c:spPr>
+    </c:floor>
+    <c:sideWall>
+      <c:thickness val="0"/>
+      <c:spPr>
+        <a:noFill/>
+        <a:ln>
+          <a:noFill/>
+        </a:ln>
+        <a:effectLst/>
+        <a:sp3d/>
+      </c:spPr>
+    </c:sideWall>
+    <c:backWall>
+      <c:thickness val="0"/>
+      <c:spPr>
+        <a:noFill/>
+        <a:ln>
+          <a:noFill/>
+        </a:ln>
+        <a:effectLst/>
+        <a:sp3d/>
+      </c:spPr>
+    </c:backWall>
+    <c:plotArea>
+      <c:layout>
+        <c:manualLayout>
+          <c:layoutTarget val="inner"/>
+          <c:xMode val="edge"/>
+          <c:yMode val="edge"/>
+          <c:x val="0.18010752952755907"/>
+          <c:y val="7.671093278106958E-2"/>
+          <c:w val="0.78067765748031492"/>
+          <c:h val="0.77054522818988502"/>
+        </c:manualLayout>
+      </c:layout>
+      <c:bar3DChart>
+        <c:barDir val="bar"/>
+        <c:grouping val="clustered"/>
+        <c:varyColors val="0"/>
+        <c:ser>
+          <c:idx val="0"/>
+          <c:order val="0"/>
+          <c:tx>
+            <c:strRef>
+              <c:f>Sheet1!$B$1</c:f>
+              <c:strCache>
+                <c:ptCount val="1"/>
+                <c:pt idx="0">
+                  <c:v>Hours Spent</c:v>
+                </c:pt>
+              </c:strCache>
+            </c:strRef>
+          </c:tx>
+          <c:spPr>
+            <a:solidFill>
+              <a:srgbClr val="FF8C00"/>
+            </a:solidFill>
+            <a:ln>
+              <a:noFill/>
+            </a:ln>
+            <a:effectLst/>
+            <a:sp3d/>
+          </c:spPr>
+          <c:invertIfNegative val="0"/>
+          <c:cat>
+            <c:strRef>
+              <c:f>Sheet1!$A$2:$A$5</c:f>
+              <c:strCache>
+                <c:ptCount val="3"/>
+                <c:pt idx="0">
+                  <c:v>Project Management</c:v>
+                </c:pt>
+                <c:pt idx="1">
+                  <c:v>Development</c:v>
+                </c:pt>
+                <c:pt idx="2">
+                  <c:v>Testing/Fixes</c:v>
+                </c:pt>
+              </c:strCache>
+            </c:strRef>
+          </c:cat>
+          <c:val>
+            <c:numRef>
+              <c:f>Sheet1!$B$2:$B$5</c:f>
+              <c:numCache>
+                <c:formatCode>General</c:formatCode>
+                <c:ptCount val="4"/>
+                <c:pt idx="0">
+                  <c:v>72</c:v>
+                </c:pt>
+                <c:pt idx="1">
+                  <c:v>253</c:v>
+                </c:pt>
+                <c:pt idx="2">
+                  <c:v>89</c:v>
+                </c:pt>
+              </c:numCache>
+            </c:numRef>
+          </c:val>
+          <c:extLst>
+            <c:ext xmlns:c16="http://schemas.microsoft.com/office/drawing/2014/chart" uri="{C3380CC4-5D6E-409C-BE32-E72D297353CC}">
+              <c16:uniqueId val="{00000000-A618-458D-B916-3D546A6F9817}"/>
+            </c:ext>
+          </c:extLst>
+        </c:ser>
+        <c:dLbls>
+          <c:showLegendKey val="0"/>
+          <c:showVal val="0"/>
+          <c:showCatName val="0"/>
+          <c:showSerName val="0"/>
+          <c:showPercent val="0"/>
+          <c:showBubbleSize val="0"/>
+        </c:dLbls>
+        <c:gapWidth val="150"/>
+        <c:shape val="box"/>
+        <c:axId val="493113280"/>
+        <c:axId val="493114920"/>
+        <c:axId val="0"/>
+      </c:bar3DChart>
+      <c:catAx>
+        <c:axId val="493113280"/>
+        <c:scaling>
+          <c:orientation val="minMax"/>
+        </c:scaling>
+        <c:delete val="0"/>
+        <c:axPos val="l"/>
+        <c:numFmt formatCode="General" sourceLinked="1"/>
+        <c:majorTickMark val="none"/>
+        <c:minorTickMark val="none"/>
+        <c:tickLblPos val="nextTo"/>
+        <c:spPr>
+          <a:noFill/>
+          <a:ln>
+            <a:noFill/>
+          </a:ln>
+          <a:effectLst/>
+        </c:spPr>
+        <c:txPr>
+          <a:bodyPr rot="-60000000" spcFirstLastPara="1" vertOverflow="ellipsis" vert="horz" wrap="square" anchor="ctr" anchorCtr="1"/>
+          <a:lstStyle/>
+          <a:p>
+            <a:pPr>
+              <a:defRPr sz="1197" b="0" i="0" u="none" strike="noStrike" kern="1200" baseline="0">
+                <a:solidFill>
+                  <a:schemeClr val="bg1"/>
+                </a:solidFill>
+                <a:latin typeface="The Bold Font" pitchFamily="2" charset="0"/>
+                <a:ea typeface="+mn-ea"/>
+                <a:cs typeface="+mn-cs"/>
+              </a:defRPr>
+            </a:pPr>
+            <a:endParaRPr lang="en-US"/>
+          </a:p>
+        </c:txPr>
+        <c:crossAx val="493114920"/>
+        <c:crosses val="autoZero"/>
+        <c:auto val="1"/>
+        <c:lblAlgn val="ctr"/>
+        <c:lblOffset val="100"/>
+        <c:noMultiLvlLbl val="0"/>
+      </c:catAx>
+      <c:valAx>
+        <c:axId val="493114920"/>
+        <c:scaling>
+          <c:orientation val="minMax"/>
+        </c:scaling>
+        <c:delete val="0"/>
+        <c:axPos val="b"/>
+        <c:majorGridlines>
+          <c:spPr>
+            <a:ln w="9525" cap="flat" cmpd="sng" algn="ctr">
+              <a:solidFill>
+                <a:schemeClr val="tx1">
+                  <a:lumMod val="15000"/>
+                  <a:lumOff val="85000"/>
+                </a:schemeClr>
+              </a:solidFill>
+              <a:round/>
+            </a:ln>
+            <a:effectLst/>
+          </c:spPr>
+        </c:majorGridlines>
+        <c:numFmt formatCode="General" sourceLinked="1"/>
+        <c:majorTickMark val="none"/>
+        <c:minorTickMark val="none"/>
+        <c:tickLblPos val="nextTo"/>
+        <c:spPr>
+          <a:noFill/>
+          <a:ln>
+            <a:noFill/>
+          </a:ln>
+          <a:effectLst/>
+        </c:spPr>
+        <c:txPr>
+          <a:bodyPr rot="-60000000" spcFirstLastPara="1" vertOverflow="ellipsis" vert="horz" wrap="square" anchor="ctr" anchorCtr="1"/>
+          <a:lstStyle/>
+          <a:p>
+            <a:pPr>
+              <a:defRPr sz="1197" b="0" i="0" u="none" strike="noStrike" kern="1200" baseline="0">
+                <a:solidFill>
+                  <a:schemeClr val="bg1"/>
+                </a:solidFill>
+                <a:latin typeface="The Bold Font" pitchFamily="2" charset="0"/>
+                <a:ea typeface="+mn-ea"/>
+                <a:cs typeface="+mn-cs"/>
+              </a:defRPr>
+            </a:pPr>
+            <a:endParaRPr lang="en-US"/>
+          </a:p>
+        </c:txPr>
+        <c:crossAx val="493113280"/>
+        <c:crosses val="autoZero"/>
+        <c:crossBetween val="between"/>
+      </c:valAx>
+      <c:spPr>
+        <a:noFill/>
+        <a:ln>
+          <a:noFill/>
+        </a:ln>
+        <a:effectLst/>
+      </c:spPr>
+    </c:plotArea>
+    <c:legend>
+      <c:legendPos val="b"/>
+      <c:legendEntry>
+        <c:idx val="0"/>
+        <c:txPr>
+          <a:bodyPr rot="0" spcFirstLastPara="1" vertOverflow="ellipsis" vert="horz" wrap="square" anchor="ctr" anchorCtr="1"/>
+          <a:lstStyle/>
+          <a:p>
+            <a:pPr>
+              <a:defRPr sz="1197" b="0" i="0" u="none" strike="noStrike" kern="1200" baseline="0">
+                <a:solidFill>
+                  <a:schemeClr val="bg1"/>
+                </a:solidFill>
+                <a:latin typeface="The Bold Font" pitchFamily="2" charset="0"/>
+                <a:ea typeface="+mn-ea"/>
+                <a:cs typeface="+mn-cs"/>
+              </a:defRPr>
+            </a:pPr>
+            <a:endParaRPr lang="en-US"/>
+          </a:p>
+        </c:txPr>
+      </c:legendEntry>
+      <c:overlay val="0"/>
+      <c:spPr>
+        <a:noFill/>
+        <a:ln>
+          <a:noFill/>
+        </a:ln>
+        <a:effectLst/>
+      </c:spPr>
+      <c:txPr>
+        <a:bodyPr rot="0" spcFirstLastPara="1" vertOverflow="ellipsis" vert="horz" wrap="square" anchor="ctr" anchorCtr="1"/>
+        <a:lstStyle/>
+        <a:p>
+          <a:pPr>
+            <a:defRPr sz="1197" b="0" i="0" u="none" strike="noStrike" kern="1200" baseline="0">
+              <a:solidFill>
+                <a:schemeClr val="tx1">
+                  <a:lumMod val="65000"/>
+                  <a:lumOff val="35000"/>
+                </a:schemeClr>
+              </a:solidFill>
+              <a:latin typeface="+mn-lt"/>
+              <a:ea typeface="+mn-ea"/>
+              <a:cs typeface="+mn-cs"/>
+            </a:defRPr>
+          </a:pPr>
+          <a:endParaRPr lang="en-US"/>
+        </a:p>
+      </c:txPr>
+    </c:legend>
+    <c:plotVisOnly val="1"/>
+    <c:dispBlanksAs val="gap"/>
+    <c:extLst>
+      <c:ext xmlns:c16r3="http://schemas.microsoft.com/office/drawing/2017/03/chart" uri="{56B9EC1D-385E-4148-901F-78D8002777C0}">
+        <c16r3:dataDisplayOptions16>
+          <c16r3:dispNaAsBlank val="1"/>
+        </c16r3:dataDisplayOptions16>
+      </c:ext>
+    </c:extLst>
+    <c:showDLblsOverMax val="0"/>
+  </c:chart>
+  <c:spPr>
+    <a:noFill/>
+    <a:ln>
+      <a:noFill/>
+    </a:ln>
+    <a:effectLst/>
+  </c:spPr>
+  <c:txPr>
+    <a:bodyPr/>
+    <a:lstStyle/>
+    <a:p>
+      <a:pPr>
+        <a:defRPr/>
+      </a:pPr>
+      <a:endParaRPr lang="en-US"/>
+    </a:p>
+  </c:txPr>
+  <c:externalData r:id="rId3">
+    <c:autoUpdate val="0"/>
+  </c:externalData>
+</c:chartSpace>
+</file>
+
 <file path=ppt/charts/colors1.xml><?xml version="1.0" encoding="utf-8"?>
 <cs:colorStyle xmlns:cs="http://schemas.microsoft.com/office/drawing/2012/chartStyle" xmlns:a="http://schemas.openxmlformats.org/drawingml/2006/main" meth="cycle" id="10">
   <a:schemeClr val="accent1"/>
@@ -1818,6 +2159,46 @@
 </cs:colorStyle>
 </file>
 
+<file path=ppt/charts/colors5.xml><?xml version="1.0" encoding="utf-8"?>
+<cs:colorStyle xmlns:cs="http://schemas.microsoft.com/office/drawing/2012/chartStyle" xmlns:a="http://schemas.openxmlformats.org/drawingml/2006/main" meth="cycle" id="10">
+  <a:schemeClr val="accent1"/>
+  <a:schemeClr val="accent2"/>
+  <a:schemeClr val="accent3"/>
+  <a:schemeClr val="accent4"/>
+  <a:schemeClr val="accent5"/>
+  <a:schemeClr val="accent6"/>
+  <cs:variation/>
+  <cs:variation>
+    <a:lumMod val="60000"/>
+  </cs:variation>
+  <cs:variation>
+    <a:lumMod val="80000"/>
+    <a:lumOff val="20000"/>
+  </cs:variation>
+  <cs:variation>
+    <a:lumMod val="80000"/>
+  </cs:variation>
+  <cs:variation>
+    <a:lumMod val="60000"/>
+    <a:lumOff val="40000"/>
+  </cs:variation>
+  <cs:variation>
+    <a:lumMod val="50000"/>
+  </cs:variation>
+  <cs:variation>
+    <a:lumMod val="70000"/>
+    <a:lumOff val="30000"/>
+  </cs:variation>
+  <cs:variation>
+    <a:lumMod val="70000"/>
+  </cs:variation>
+  <cs:variation>
+    <a:lumMod val="50000"/>
+    <a:lumOff val="50000"/>
+  </cs:variation>
+</cs:colorStyle>
+</file>
+
 <file path=ppt/charts/style1.xml><?xml version="1.0" encoding="utf-8"?>
 <cs:chartStyle xmlns:cs="http://schemas.microsoft.com/office/drawing/2012/chartStyle" xmlns:a="http://schemas.openxmlformats.org/drawingml/2006/main" id="262">
   <cs:axisTitle>
@@ -3552,6 +3933,500 @@
       <cs:styleClr val="auto"/>
     </cs:lnRef>
     <cs:fillRef idx="0"/>
+    <cs:effectRef idx="0"/>
+    <cs:fontRef idx="minor">
+      <a:schemeClr val="tx1"/>
+    </cs:fontRef>
+    <cs:spPr>
+      <a:ln w="9525" cap="rnd">
+        <a:solidFill>
+          <a:schemeClr val="phClr"/>
+        </a:solidFill>
+        <a:round/>
+      </a:ln>
+    </cs:spPr>
+  </cs:dataPointWireframe>
+  <cs:dataTable>
+    <cs:lnRef idx="0"/>
+    <cs:fillRef idx="0"/>
+    <cs:effectRef idx="0"/>
+    <cs:fontRef idx="minor">
+      <a:schemeClr val="tx1">
+        <a:lumMod val="65000"/>
+        <a:lumOff val="35000"/>
+      </a:schemeClr>
+    </cs:fontRef>
+    <cs:spPr>
+      <a:noFill/>
+      <a:ln w="9525" cap="flat" cmpd="sng" algn="ctr">
+        <a:solidFill>
+          <a:schemeClr val="tx1">
+            <a:lumMod val="15000"/>
+            <a:lumOff val="85000"/>
+          </a:schemeClr>
+        </a:solidFill>
+        <a:round/>
+      </a:ln>
+    </cs:spPr>
+    <cs:defRPr sz="1197" kern="1200"/>
+  </cs:dataTable>
+  <cs:downBar>
+    <cs:lnRef idx="0"/>
+    <cs:fillRef idx="0"/>
+    <cs:effectRef idx="0"/>
+    <cs:fontRef idx="minor">
+      <a:schemeClr val="tx1"/>
+    </cs:fontRef>
+    <cs:spPr>
+      <a:solidFill>
+        <a:schemeClr val="dk1">
+          <a:lumMod val="75000"/>
+          <a:lumOff val="25000"/>
+        </a:schemeClr>
+      </a:solidFill>
+      <a:ln w="9525" cap="flat" cmpd="sng" algn="ctr">
+        <a:solidFill>
+          <a:schemeClr val="tx1">
+            <a:lumMod val="65000"/>
+            <a:lumOff val="35000"/>
+          </a:schemeClr>
+        </a:solidFill>
+        <a:round/>
+      </a:ln>
+    </cs:spPr>
+  </cs:downBar>
+  <cs:dropLine>
+    <cs:lnRef idx="0"/>
+    <cs:fillRef idx="0"/>
+    <cs:effectRef idx="0"/>
+    <cs:fontRef idx="minor">
+      <a:schemeClr val="tx1"/>
+    </cs:fontRef>
+    <cs:spPr>
+      <a:ln w="9525" cap="flat" cmpd="sng" algn="ctr">
+        <a:solidFill>
+          <a:schemeClr val="tx1">
+            <a:lumMod val="35000"/>
+            <a:lumOff val="65000"/>
+          </a:schemeClr>
+        </a:solidFill>
+        <a:round/>
+      </a:ln>
+    </cs:spPr>
+  </cs:dropLine>
+  <cs:errorBar>
+    <cs:lnRef idx="0"/>
+    <cs:fillRef idx="0"/>
+    <cs:effectRef idx="0"/>
+    <cs:fontRef idx="minor">
+      <a:schemeClr val="tx1"/>
+    </cs:fontRef>
+    <cs:spPr>
+      <a:ln w="9525" cap="flat" cmpd="sng" algn="ctr">
+        <a:solidFill>
+          <a:schemeClr val="tx1">
+            <a:lumMod val="65000"/>
+            <a:lumOff val="35000"/>
+          </a:schemeClr>
+        </a:solidFill>
+        <a:round/>
+      </a:ln>
+    </cs:spPr>
+  </cs:errorBar>
+  <cs:floor>
+    <cs:lnRef idx="0"/>
+    <cs:fillRef idx="0"/>
+    <cs:effectRef idx="0"/>
+    <cs:fontRef idx="minor">
+      <a:schemeClr val="tx1"/>
+    </cs:fontRef>
+    <cs:spPr>
+      <a:noFill/>
+      <a:ln>
+        <a:noFill/>
+      </a:ln>
+    </cs:spPr>
+  </cs:floor>
+  <cs:gridlineMajor>
+    <cs:lnRef idx="0"/>
+    <cs:fillRef idx="0"/>
+    <cs:effectRef idx="0"/>
+    <cs:fontRef idx="minor">
+      <a:schemeClr val="tx1"/>
+    </cs:fontRef>
+    <cs:spPr>
+      <a:ln w="9525" cap="flat" cmpd="sng" algn="ctr">
+        <a:solidFill>
+          <a:schemeClr val="tx1">
+            <a:lumMod val="15000"/>
+            <a:lumOff val="85000"/>
+          </a:schemeClr>
+        </a:solidFill>
+        <a:round/>
+      </a:ln>
+    </cs:spPr>
+  </cs:gridlineMajor>
+  <cs:gridlineMinor>
+    <cs:lnRef idx="0"/>
+    <cs:fillRef idx="0"/>
+    <cs:effectRef idx="0"/>
+    <cs:fontRef idx="minor">
+      <a:schemeClr val="tx1"/>
+    </cs:fontRef>
+    <cs:spPr>
+      <a:ln w="9525" cap="flat" cmpd="sng" algn="ctr">
+        <a:solidFill>
+          <a:schemeClr val="tx1">
+            <a:lumMod val="5000"/>
+            <a:lumOff val="95000"/>
+          </a:schemeClr>
+        </a:solidFill>
+        <a:round/>
+      </a:ln>
+    </cs:spPr>
+  </cs:gridlineMinor>
+  <cs:hiLoLine>
+    <cs:lnRef idx="0"/>
+    <cs:fillRef idx="0"/>
+    <cs:effectRef idx="0"/>
+    <cs:fontRef idx="minor">
+      <a:schemeClr val="tx1"/>
+    </cs:fontRef>
+    <cs:spPr>
+      <a:ln w="9525" cap="flat" cmpd="sng" algn="ctr">
+        <a:solidFill>
+          <a:schemeClr val="tx1">
+            <a:lumMod val="50000"/>
+            <a:lumOff val="50000"/>
+          </a:schemeClr>
+        </a:solidFill>
+        <a:round/>
+      </a:ln>
+    </cs:spPr>
+  </cs:hiLoLine>
+  <cs:leaderLine>
+    <cs:lnRef idx="0"/>
+    <cs:fillRef idx="0"/>
+    <cs:effectRef idx="0"/>
+    <cs:fontRef idx="minor">
+      <a:schemeClr val="tx1"/>
+    </cs:fontRef>
+    <cs:spPr>
+      <a:ln w="9525" cap="flat" cmpd="sng" algn="ctr">
+        <a:solidFill>
+          <a:schemeClr val="tx1">
+            <a:lumMod val="35000"/>
+            <a:lumOff val="65000"/>
+          </a:schemeClr>
+        </a:solidFill>
+        <a:round/>
+      </a:ln>
+    </cs:spPr>
+  </cs:leaderLine>
+  <cs:legend>
+    <cs:lnRef idx="0"/>
+    <cs:fillRef idx="0"/>
+    <cs:effectRef idx="0"/>
+    <cs:fontRef idx="minor">
+      <a:schemeClr val="tx1">
+        <a:lumMod val="65000"/>
+        <a:lumOff val="35000"/>
+      </a:schemeClr>
+    </cs:fontRef>
+    <cs:defRPr sz="1197" kern="1200"/>
+  </cs:legend>
+  <cs:plotArea mods="allowNoFillOverride allowNoLineOverride">
+    <cs:lnRef idx="0"/>
+    <cs:fillRef idx="0"/>
+    <cs:effectRef idx="0"/>
+    <cs:fontRef idx="minor">
+      <a:schemeClr val="tx1"/>
+    </cs:fontRef>
+  </cs:plotArea>
+  <cs:plotArea3D mods="allowNoFillOverride allowNoLineOverride">
+    <cs:lnRef idx="0"/>
+    <cs:fillRef idx="0"/>
+    <cs:effectRef idx="0"/>
+    <cs:fontRef idx="minor">
+      <a:schemeClr val="tx1"/>
+    </cs:fontRef>
+  </cs:plotArea3D>
+  <cs:seriesAxis>
+    <cs:lnRef idx="0"/>
+    <cs:fillRef idx="0"/>
+    <cs:effectRef idx="0"/>
+    <cs:fontRef idx="minor">
+      <a:schemeClr val="tx1">
+        <a:lumMod val="65000"/>
+        <a:lumOff val="35000"/>
+      </a:schemeClr>
+    </cs:fontRef>
+    <cs:defRPr sz="1197" kern="1200"/>
+  </cs:seriesAxis>
+  <cs:seriesLine>
+    <cs:lnRef idx="0"/>
+    <cs:fillRef idx="0"/>
+    <cs:effectRef idx="0"/>
+    <cs:fontRef idx="minor">
+      <a:schemeClr val="tx1"/>
+    </cs:fontRef>
+    <cs:spPr>
+      <a:ln w="9525" cap="flat" cmpd="sng" algn="ctr">
+        <a:solidFill>
+          <a:schemeClr val="tx1">
+            <a:lumMod val="35000"/>
+            <a:lumOff val="65000"/>
+          </a:schemeClr>
+        </a:solidFill>
+        <a:round/>
+      </a:ln>
+    </cs:spPr>
+  </cs:seriesLine>
+  <cs:title>
+    <cs:lnRef idx="0"/>
+    <cs:fillRef idx="0"/>
+    <cs:effectRef idx="0"/>
+    <cs:fontRef idx="minor">
+      <a:schemeClr val="tx1">
+        <a:lumMod val="65000"/>
+        <a:lumOff val="35000"/>
+      </a:schemeClr>
+    </cs:fontRef>
+    <cs:defRPr sz="1862" b="0" kern="1200" spc="0" baseline="0"/>
+  </cs:title>
+  <cs:trendline>
+    <cs:lnRef idx="0">
+      <cs:styleClr val="auto"/>
+    </cs:lnRef>
+    <cs:fillRef idx="0"/>
+    <cs:effectRef idx="0"/>
+    <cs:fontRef idx="minor">
+      <a:schemeClr val="tx1"/>
+    </cs:fontRef>
+    <cs:spPr>
+      <a:ln w="19050" cap="rnd">
+        <a:solidFill>
+          <a:schemeClr val="phClr"/>
+        </a:solidFill>
+        <a:prstDash val="sysDot"/>
+      </a:ln>
+    </cs:spPr>
+  </cs:trendline>
+  <cs:trendlineLabel>
+    <cs:lnRef idx="0"/>
+    <cs:fillRef idx="0"/>
+    <cs:effectRef idx="0"/>
+    <cs:fontRef idx="minor">
+      <a:schemeClr val="tx1">
+        <a:lumMod val="65000"/>
+        <a:lumOff val="35000"/>
+      </a:schemeClr>
+    </cs:fontRef>
+    <cs:defRPr sz="1197" kern="1200"/>
+  </cs:trendlineLabel>
+  <cs:upBar>
+    <cs:lnRef idx="0"/>
+    <cs:fillRef idx="0"/>
+    <cs:effectRef idx="0"/>
+    <cs:fontRef idx="minor">
+      <a:schemeClr val="tx1"/>
+    </cs:fontRef>
+    <cs:spPr>
+      <a:solidFill>
+        <a:schemeClr val="lt1"/>
+      </a:solidFill>
+      <a:ln w="9525" cap="flat" cmpd="sng" algn="ctr">
+        <a:solidFill>
+          <a:schemeClr val="tx1">
+            <a:lumMod val="65000"/>
+            <a:lumOff val="35000"/>
+          </a:schemeClr>
+        </a:solidFill>
+        <a:round/>
+      </a:ln>
+    </cs:spPr>
+  </cs:upBar>
+  <cs:valueAxis>
+    <cs:lnRef idx="0"/>
+    <cs:fillRef idx="0"/>
+    <cs:effectRef idx="0"/>
+    <cs:fontRef idx="minor">
+      <a:schemeClr val="tx1">
+        <a:lumMod val="65000"/>
+        <a:lumOff val="35000"/>
+      </a:schemeClr>
+    </cs:fontRef>
+    <cs:defRPr sz="1197" kern="1200"/>
+  </cs:valueAxis>
+  <cs:wall>
+    <cs:lnRef idx="0"/>
+    <cs:fillRef idx="0"/>
+    <cs:effectRef idx="0"/>
+    <cs:fontRef idx="minor">
+      <a:schemeClr val="tx1"/>
+    </cs:fontRef>
+    <cs:spPr>
+      <a:noFill/>
+      <a:ln>
+        <a:noFill/>
+      </a:ln>
+    </cs:spPr>
+  </cs:wall>
+</cs:chartStyle>
+</file>
+
+<file path=ppt/charts/style5.xml><?xml version="1.0" encoding="utf-8"?>
+<cs:chartStyle xmlns:cs="http://schemas.microsoft.com/office/drawing/2012/chartStyle" xmlns:a="http://schemas.openxmlformats.org/drawingml/2006/main" id="286">
+  <cs:axisTitle>
+    <cs:lnRef idx="0"/>
+    <cs:fillRef idx="0"/>
+    <cs:effectRef idx="0"/>
+    <cs:fontRef idx="minor">
+      <a:schemeClr val="tx1">
+        <a:lumMod val="65000"/>
+        <a:lumOff val="35000"/>
+      </a:schemeClr>
+    </cs:fontRef>
+    <cs:defRPr sz="1330" kern="1200"/>
+  </cs:axisTitle>
+  <cs:categoryAxis>
+    <cs:lnRef idx="0"/>
+    <cs:fillRef idx="0"/>
+    <cs:effectRef idx="0"/>
+    <cs:fontRef idx="minor">
+      <a:schemeClr val="tx1">
+        <a:lumMod val="65000"/>
+        <a:lumOff val="35000"/>
+      </a:schemeClr>
+    </cs:fontRef>
+    <cs:defRPr sz="1197" kern="1200"/>
+  </cs:categoryAxis>
+  <cs:chartArea mods="allowNoFillOverride allowNoLineOverride">
+    <cs:lnRef idx="0"/>
+    <cs:fillRef idx="0"/>
+    <cs:effectRef idx="0"/>
+    <cs:fontRef idx="minor">
+      <a:schemeClr val="tx1"/>
+    </cs:fontRef>
+    <cs:spPr>
+      <a:solidFill>
+        <a:schemeClr val="bg1"/>
+      </a:solidFill>
+      <a:ln w="9525" cap="flat" cmpd="sng" algn="ctr">
+        <a:solidFill>
+          <a:schemeClr val="tx1">
+            <a:lumMod val="15000"/>
+            <a:lumOff val="85000"/>
+          </a:schemeClr>
+        </a:solidFill>
+        <a:round/>
+      </a:ln>
+    </cs:spPr>
+    <cs:defRPr sz="1330" kern="1200"/>
+  </cs:chartArea>
+  <cs:dataLabel>
+    <cs:lnRef idx="0"/>
+    <cs:fillRef idx="0"/>
+    <cs:effectRef idx="0"/>
+    <cs:fontRef idx="minor">
+      <a:schemeClr val="tx1">
+        <a:lumMod val="75000"/>
+        <a:lumOff val="25000"/>
+      </a:schemeClr>
+    </cs:fontRef>
+    <cs:defRPr sz="1197" kern="1200"/>
+  </cs:dataLabel>
+  <cs:dataLabelCallout>
+    <cs:lnRef idx="0"/>
+    <cs:fillRef idx="0"/>
+    <cs:effectRef idx="0"/>
+    <cs:fontRef idx="minor">
+      <a:schemeClr val="dk1">
+        <a:lumMod val="65000"/>
+        <a:lumOff val="35000"/>
+      </a:schemeClr>
+    </cs:fontRef>
+    <cs:spPr>
+      <a:solidFill>
+        <a:schemeClr val="lt1"/>
+      </a:solidFill>
+      <a:ln>
+        <a:solidFill>
+          <a:schemeClr val="dk1">
+            <a:lumMod val="25000"/>
+            <a:lumOff val="75000"/>
+          </a:schemeClr>
+        </a:solidFill>
+      </a:ln>
+    </cs:spPr>
+    <cs:defRPr sz="1197" kern="1200"/>
+    <cs:bodyPr rot="0" spcFirstLastPara="1" vertOverflow="clip" horzOverflow="clip" vert="horz" wrap="square" lIns="36576" tIns="18288" rIns="36576" bIns="18288" anchor="ctr" anchorCtr="1">
+      <a:spAutoFit/>
+    </cs:bodyPr>
+  </cs:dataLabelCallout>
+  <cs:dataPoint>
+    <cs:lnRef idx="0"/>
+    <cs:fillRef idx="1">
+      <cs:styleClr val="auto"/>
+    </cs:fillRef>
+    <cs:effectRef idx="0"/>
+    <cs:fontRef idx="minor">
+      <a:schemeClr val="tx1"/>
+    </cs:fontRef>
+  </cs:dataPoint>
+  <cs:dataPoint3D>
+    <cs:lnRef idx="0"/>
+    <cs:fillRef idx="1">
+      <cs:styleClr val="auto"/>
+    </cs:fillRef>
+    <cs:effectRef idx="0"/>
+    <cs:fontRef idx="minor">
+      <a:schemeClr val="tx1"/>
+    </cs:fontRef>
+  </cs:dataPoint3D>
+  <cs:dataPointLine>
+    <cs:lnRef idx="0">
+      <cs:styleClr val="auto"/>
+    </cs:lnRef>
+    <cs:fillRef idx="1"/>
+    <cs:effectRef idx="0"/>
+    <cs:fontRef idx="minor">
+      <a:schemeClr val="tx1"/>
+    </cs:fontRef>
+    <cs:spPr>
+      <a:ln w="28575" cap="rnd">
+        <a:solidFill>
+          <a:schemeClr val="phClr"/>
+        </a:solidFill>
+        <a:round/>
+      </a:ln>
+    </cs:spPr>
+  </cs:dataPointLine>
+  <cs:dataPointMarker>
+    <cs:lnRef idx="0">
+      <cs:styleClr val="auto"/>
+    </cs:lnRef>
+    <cs:fillRef idx="1">
+      <cs:styleClr val="auto"/>
+    </cs:fillRef>
+    <cs:effectRef idx="0"/>
+    <cs:fontRef idx="minor">
+      <a:schemeClr val="tx1"/>
+    </cs:fontRef>
+    <cs:spPr>
+      <a:ln w="9525">
+        <a:solidFill>
+          <a:schemeClr val="phClr"/>
+        </a:solidFill>
+      </a:ln>
+    </cs:spPr>
+  </cs:dataPointMarker>
+  <cs:dataPointMarkerLayout symbol="circle" size="5"/>
+  <cs:dataPointWireframe>
+    <cs:lnRef idx="0">
+      <cs:styleClr val="auto"/>
+    </cs:lnRef>
+    <cs:fillRef idx="1"/>
     <cs:effectRef idx="0"/>
     <cs:fontRef idx="minor">
       <a:schemeClr val="tx1"/>
@@ -4398,7 +5273,7 @@
           <a:p>
             <a:fld id="{07E3F707-0AD7-4AB7-AA47-74FF12BC8C23}" type="slidenum">
               <a:rPr lang="en-US" smtClean="0"/>
-              <a:t>7</a:t>
+              <a:t>6</a:t>
             </a:fld>
             <a:endParaRPr lang="en-US"/>
           </a:p>
@@ -7829,6 +8704,553 @@
           <a:chExt cx="0" cy="0"/>
         </a:xfrm>
       </p:grpSpPr>
+      <p:sp>
+        <p:nvSpPr>
+          <p:cNvPr id="9" name="Rectangle 8">
+            <a:extLst>
+              <a:ext uri="{FF2B5EF4-FFF2-40B4-BE49-F238E27FC236}">
+                <a16:creationId xmlns:a16="http://schemas.microsoft.com/office/drawing/2014/main" id="{5517070E-EEBC-496B-B363-0FF9C639F972}"/>
+              </a:ext>
+            </a:extLst>
+          </p:cNvPr>
+          <p:cNvSpPr/>
+          <p:nvPr/>
+        </p:nvSpPr>
+        <p:spPr>
+          <a:xfrm>
+            <a:off x="0" y="0"/>
+            <a:ext cx="12192000" cy="6858000"/>
+          </a:xfrm>
+          <a:prstGeom prst="rect">
+            <a:avLst/>
+          </a:prstGeom>
+          <a:solidFill>
+            <a:srgbClr val="00CED1"/>
+          </a:solidFill>
+          <a:ln>
+            <a:noFill/>
+          </a:ln>
+        </p:spPr>
+        <p:style>
+          <a:lnRef idx="2">
+            <a:schemeClr val="accent1">
+              <a:shade val="50000"/>
+            </a:schemeClr>
+          </a:lnRef>
+          <a:fillRef idx="1">
+            <a:schemeClr val="accent1"/>
+          </a:fillRef>
+          <a:effectRef idx="0">
+            <a:schemeClr val="accent1"/>
+          </a:effectRef>
+          <a:fontRef idx="minor">
+            <a:schemeClr val="lt1"/>
+          </a:fontRef>
+        </p:style>
+        <p:txBody>
+          <a:bodyPr rtlCol="0" anchor="ctr"/>
+          <a:lstStyle/>
+          <a:p>
+            <a:pPr algn="ctr"/>
+            <a:endParaRPr lang="en-US" dirty="0"/>
+          </a:p>
+        </p:txBody>
+      </p:sp>
+      <p:sp>
+        <p:nvSpPr>
+          <p:cNvPr id="5" name="TextBox 4">
+            <a:extLst>
+              <a:ext uri="{FF2B5EF4-FFF2-40B4-BE49-F238E27FC236}">
+                <a16:creationId xmlns:a16="http://schemas.microsoft.com/office/drawing/2014/main" id="{BF221FEC-E642-45EF-AE68-A8CABBD39594}"/>
+              </a:ext>
+            </a:extLst>
+          </p:cNvPr>
+          <p:cNvSpPr txBox="1"/>
+          <p:nvPr/>
+        </p:nvSpPr>
+        <p:spPr>
+          <a:xfrm>
+            <a:off x="2204305" y="-82361"/>
+            <a:ext cx="6676010" cy="1862048"/>
+          </a:xfrm>
+          <a:prstGeom prst="rect">
+            <a:avLst/>
+          </a:prstGeom>
+          <a:noFill/>
+          <a:effectLst>
+            <a:outerShdw blurRad="50800" dist="38100" algn="l" rotWithShape="0">
+              <a:prstClr val="black">
+                <a:alpha val="40000"/>
+              </a:prstClr>
+            </a:outerShdw>
+          </a:effectLst>
+        </p:spPr>
+        <p:txBody>
+          <a:bodyPr wrap="square" rtlCol="0">
+            <a:spAutoFit/>
+          </a:bodyPr>
+          <a:lstStyle/>
+          <a:p>
+            <a:pPr algn="ctr"/>
+            <a:r>
+              <a:rPr lang="en-US" sz="11500" dirty="0">
+                <a:solidFill>
+                  <a:schemeClr val="bg1"/>
+                </a:solidFill>
+                <a:latin typeface="The Bold Font" pitchFamily="2" charset="0"/>
+              </a:rPr>
+              <a:t>testing</a:t>
+            </a:r>
+          </a:p>
+        </p:txBody>
+      </p:sp>
+      <p:pic>
+        <p:nvPicPr>
+          <p:cNvPr id="6" name="Picture 5" descr="A close up of a logo&#10;&#10;Description automatically generated">
+            <a:extLst>
+              <a:ext uri="{FF2B5EF4-FFF2-40B4-BE49-F238E27FC236}">
+                <a16:creationId xmlns:a16="http://schemas.microsoft.com/office/drawing/2014/main" id="{6ACACFD9-BE4E-4D16-A1C9-1FC45C5DD517}"/>
+              </a:ext>
+            </a:extLst>
+          </p:cNvPr>
+          <p:cNvPicPr>
+            <a:picLocks noChangeAspect="1"/>
+          </p:cNvPicPr>
+          <p:nvPr/>
+        </p:nvPicPr>
+        <p:blipFill>
+          <a:blip r:embed="rId2">
+            <a:extLst>
+              <a:ext uri="{28A0092B-C50C-407E-A947-70E740481C1C}">
+                <a14:useLocalDpi xmlns:a14="http://schemas.microsoft.com/office/drawing/2010/main" val="0"/>
+              </a:ext>
+            </a:extLst>
+          </a:blip>
+          <a:stretch>
+            <a:fillRect/>
+          </a:stretch>
+        </p:blipFill>
+        <p:spPr>
+          <a:xfrm>
+            <a:off x="607801" y="2330840"/>
+            <a:ext cx="4673252" cy="4673252"/>
+          </a:xfrm>
+          <a:prstGeom prst="rect">
+            <a:avLst/>
+          </a:prstGeom>
+        </p:spPr>
+      </p:pic>
+      <p:sp>
+        <p:nvSpPr>
+          <p:cNvPr id="7" name="TextBox 6">
+            <a:extLst>
+              <a:ext uri="{FF2B5EF4-FFF2-40B4-BE49-F238E27FC236}">
+                <a16:creationId xmlns:a16="http://schemas.microsoft.com/office/drawing/2014/main" id="{C7A737D9-7C89-4387-B329-7DD818414DFF}"/>
+              </a:ext>
+            </a:extLst>
+          </p:cNvPr>
+          <p:cNvSpPr txBox="1"/>
+          <p:nvPr/>
+        </p:nvSpPr>
+        <p:spPr>
+          <a:xfrm>
+            <a:off x="5004922" y="1677050"/>
+            <a:ext cx="5671669" cy="5078313"/>
+          </a:xfrm>
+          <a:prstGeom prst="rect">
+            <a:avLst/>
+          </a:prstGeom>
+          <a:noFill/>
+        </p:spPr>
+        <p:txBody>
+          <a:bodyPr wrap="square" rtlCol="0">
+            <a:spAutoFit/>
+          </a:bodyPr>
+          <a:lstStyle/>
+          <a:p>
+            <a:pPr marL="571500" indent="-571500">
+              <a:buFont typeface="Arial" panose="020B0604020202020204" pitchFamily="34" charset="0"/>
+              <a:buChar char="•"/>
+            </a:pPr>
+            <a:r>
+              <a:rPr lang="en-US" sz="3600" dirty="0">
+                <a:solidFill>
+                  <a:schemeClr val="bg1"/>
+                </a:solidFill>
+                <a:latin typeface="The Bold Font" pitchFamily="2" charset="0"/>
+              </a:rPr>
+              <a:t>Done in pairs</a:t>
+            </a:r>
+          </a:p>
+          <a:p>
+            <a:pPr marL="571500" indent="-571500">
+              <a:buFont typeface="Arial" panose="020B0604020202020204" pitchFamily="34" charset="0"/>
+              <a:buChar char="•"/>
+            </a:pPr>
+            <a:endParaRPr lang="en-US" sz="3600" dirty="0">
+              <a:solidFill>
+                <a:schemeClr val="bg1"/>
+              </a:solidFill>
+              <a:latin typeface="The Bold Font" pitchFamily="2" charset="0"/>
+            </a:endParaRPr>
+          </a:p>
+          <a:p>
+            <a:pPr marL="571500" indent="-571500">
+              <a:buFont typeface="Arial" panose="020B0604020202020204" pitchFamily="34" charset="0"/>
+              <a:buChar char="•"/>
+            </a:pPr>
+            <a:r>
+              <a:rPr lang="en-US" sz="3600" dirty="0">
+                <a:solidFill>
+                  <a:schemeClr val="bg1"/>
+                </a:solidFill>
+                <a:latin typeface="The Bold Font" pitchFamily="2" charset="0"/>
+              </a:rPr>
+              <a:t>Performed on parts not made by the pair</a:t>
+            </a:r>
+          </a:p>
+          <a:p>
+            <a:pPr marL="571500" indent="-571500">
+              <a:buFont typeface="Arial" panose="020B0604020202020204" pitchFamily="34" charset="0"/>
+              <a:buChar char="•"/>
+            </a:pPr>
+            <a:endParaRPr lang="en-US" sz="3600" dirty="0">
+              <a:solidFill>
+                <a:schemeClr val="bg1"/>
+              </a:solidFill>
+              <a:latin typeface="The Bold Font" pitchFamily="2" charset="0"/>
+            </a:endParaRPr>
+          </a:p>
+          <a:p>
+            <a:pPr marL="571500" indent="-571500">
+              <a:buFont typeface="Arial" panose="020B0604020202020204" pitchFamily="34" charset="0"/>
+              <a:buChar char="•"/>
+            </a:pPr>
+            <a:r>
+              <a:rPr lang="en-US" sz="3600" dirty="0">
+                <a:solidFill>
+                  <a:schemeClr val="bg1"/>
+                </a:solidFill>
+                <a:latin typeface="The Bold Font" pitchFamily="2" charset="0"/>
+              </a:rPr>
+              <a:t>Application wide</a:t>
+            </a:r>
+          </a:p>
+          <a:p>
+            <a:pPr marL="571500" indent="-571500">
+              <a:buFont typeface="Arial" panose="020B0604020202020204" pitchFamily="34" charset="0"/>
+              <a:buChar char="•"/>
+            </a:pPr>
+            <a:endParaRPr lang="en-US" sz="3600" dirty="0">
+              <a:solidFill>
+                <a:schemeClr val="bg1"/>
+              </a:solidFill>
+              <a:latin typeface="The Bold Font" pitchFamily="2" charset="0"/>
+            </a:endParaRPr>
+          </a:p>
+          <a:p>
+            <a:pPr marL="571500" indent="-571500">
+              <a:buFont typeface="Arial" panose="020B0604020202020204" pitchFamily="34" charset="0"/>
+              <a:buChar char="•"/>
+            </a:pPr>
+            <a:r>
+              <a:rPr lang="en-US" sz="3600" dirty="0">
+                <a:solidFill>
+                  <a:schemeClr val="bg1"/>
+                </a:solidFill>
+                <a:latin typeface="The Bold Font" pitchFamily="2" charset="0"/>
+              </a:rPr>
+              <a:t>Regression / unit / integration</a:t>
+            </a:r>
+          </a:p>
+        </p:txBody>
+      </p:sp>
+    </p:spTree>
+    <p:extLst>
+      <p:ext uri="{BB962C8B-B14F-4D97-AF65-F5344CB8AC3E}">
+        <p14:creationId xmlns:p14="http://schemas.microsoft.com/office/powerpoint/2010/main" val="455917237"/>
+      </p:ext>
+    </p:extLst>
+  </p:cSld>
+  <p:clrMapOvr>
+    <a:masterClrMapping/>
+  </p:clrMapOvr>
+</p:sld>
+</file>
+
+<file path=ppt/slides/slide11.xml><?xml version="1.0" encoding="utf-8"?>
+<p:sld xmlns:a="http://schemas.openxmlformats.org/drawingml/2006/main" xmlns:r="http://schemas.openxmlformats.org/officeDocument/2006/relationships" xmlns:p="http://schemas.openxmlformats.org/presentationml/2006/main">
+  <p:cSld>
+    <p:spTree>
+      <p:nvGrpSpPr>
+        <p:cNvPr id="1" name=""/>
+        <p:cNvGrpSpPr/>
+        <p:nvPr/>
+      </p:nvGrpSpPr>
+      <p:grpSpPr>
+        <a:xfrm>
+          <a:off x="0" y="0"/>
+          <a:ext cx="0" cy="0"/>
+          <a:chOff x="0" y="0"/>
+          <a:chExt cx="0" cy="0"/>
+        </a:xfrm>
+      </p:grpSpPr>
+      <p:sp>
+        <p:nvSpPr>
+          <p:cNvPr id="7" name="Rectangle 6">
+            <a:extLst>
+              <a:ext uri="{FF2B5EF4-FFF2-40B4-BE49-F238E27FC236}">
+                <a16:creationId xmlns:a16="http://schemas.microsoft.com/office/drawing/2014/main" id="{2D7E2373-A9F6-4A38-807D-03D46852DADD}"/>
+              </a:ext>
+            </a:extLst>
+          </p:cNvPr>
+          <p:cNvSpPr/>
+          <p:nvPr/>
+        </p:nvSpPr>
+        <p:spPr>
+          <a:xfrm>
+            <a:off x="2227634" y="0"/>
+            <a:ext cx="9964366" cy="6858000"/>
+          </a:xfrm>
+          <a:prstGeom prst="rect">
+            <a:avLst/>
+          </a:prstGeom>
+          <a:solidFill>
+            <a:srgbClr val="FF8C00"/>
+          </a:solidFill>
+          <a:ln>
+            <a:noFill/>
+          </a:ln>
+        </p:spPr>
+        <p:style>
+          <a:lnRef idx="2">
+            <a:schemeClr val="accent1">
+              <a:shade val="50000"/>
+            </a:schemeClr>
+          </a:lnRef>
+          <a:fillRef idx="1">
+            <a:schemeClr val="accent1"/>
+          </a:fillRef>
+          <a:effectRef idx="0">
+            <a:schemeClr val="accent1"/>
+          </a:effectRef>
+          <a:fontRef idx="minor">
+            <a:schemeClr val="lt1"/>
+          </a:fontRef>
+        </p:style>
+        <p:txBody>
+          <a:bodyPr rtlCol="0" anchor="ctr"/>
+          <a:lstStyle/>
+          <a:p>
+            <a:pPr algn="ctr"/>
+            <a:endParaRPr lang="en-US" dirty="0"/>
+          </a:p>
+        </p:txBody>
+      </p:sp>
+      <p:sp>
+        <p:nvSpPr>
+          <p:cNvPr id="5" name="TextBox 4">
+            <a:extLst>
+              <a:ext uri="{FF2B5EF4-FFF2-40B4-BE49-F238E27FC236}">
+                <a16:creationId xmlns:a16="http://schemas.microsoft.com/office/drawing/2014/main" id="{BF221FEC-E642-45EF-AE68-A8CABBD39594}"/>
+              </a:ext>
+            </a:extLst>
+          </p:cNvPr>
+          <p:cNvSpPr txBox="1"/>
+          <p:nvPr/>
+        </p:nvSpPr>
+        <p:spPr>
+          <a:xfrm>
+            <a:off x="1759351" y="170066"/>
+            <a:ext cx="10432649" cy="2092881"/>
+          </a:xfrm>
+          <a:prstGeom prst="rect">
+            <a:avLst/>
+          </a:prstGeom>
+          <a:noFill/>
+          <a:effectLst>
+            <a:outerShdw blurRad="50800" dist="38100" algn="l" rotWithShape="0">
+              <a:prstClr val="black">
+                <a:alpha val="40000"/>
+              </a:prstClr>
+            </a:outerShdw>
+          </a:effectLst>
+        </p:spPr>
+        <p:txBody>
+          <a:bodyPr wrap="square" rtlCol="0">
+            <a:spAutoFit/>
+          </a:bodyPr>
+          <a:lstStyle/>
+          <a:p>
+            <a:pPr algn="ctr"/>
+            <a:r>
+              <a:rPr lang="en-US" sz="13000" dirty="0">
+                <a:solidFill>
+                  <a:schemeClr val="bg1"/>
+                </a:solidFill>
+                <a:latin typeface="The Bold Font" pitchFamily="2" charset="0"/>
+              </a:rPr>
+              <a:t>The future</a:t>
+            </a:r>
+          </a:p>
+        </p:txBody>
+      </p:sp>
+      <p:sp>
+        <p:nvSpPr>
+          <p:cNvPr id="6" name="TextBox 5">
+            <a:extLst>
+              <a:ext uri="{FF2B5EF4-FFF2-40B4-BE49-F238E27FC236}">
+                <a16:creationId xmlns:a16="http://schemas.microsoft.com/office/drawing/2014/main" id="{A49A815F-0ACF-4062-990A-CF1F68002291}"/>
+              </a:ext>
+            </a:extLst>
+          </p:cNvPr>
+          <p:cNvSpPr txBox="1"/>
+          <p:nvPr/>
+        </p:nvSpPr>
+        <p:spPr>
+          <a:xfrm>
+            <a:off x="6988614" y="3157768"/>
+            <a:ext cx="5671669" cy="2308324"/>
+          </a:xfrm>
+          <a:prstGeom prst="rect">
+            <a:avLst/>
+          </a:prstGeom>
+          <a:noFill/>
+        </p:spPr>
+        <p:txBody>
+          <a:bodyPr wrap="square" rtlCol="0">
+            <a:spAutoFit/>
+          </a:bodyPr>
+          <a:lstStyle/>
+          <a:p>
+            <a:pPr marL="571500" indent="-571500">
+              <a:buFont typeface="Arial" panose="020B0604020202020204" pitchFamily="34" charset="0"/>
+              <a:buChar char="•"/>
+            </a:pPr>
+            <a:r>
+              <a:rPr lang="en-US" sz="3600" dirty="0">
+                <a:solidFill>
+                  <a:schemeClr val="bg1"/>
+                </a:solidFill>
+                <a:latin typeface="The Bold Font" pitchFamily="2" charset="0"/>
+              </a:rPr>
+              <a:t>ai</a:t>
+            </a:r>
+          </a:p>
+          <a:p>
+            <a:pPr marL="571500" indent="-571500">
+              <a:buFont typeface="Arial" panose="020B0604020202020204" pitchFamily="34" charset="0"/>
+              <a:buChar char="•"/>
+            </a:pPr>
+            <a:endParaRPr lang="en-US" sz="3600" dirty="0">
+              <a:solidFill>
+                <a:schemeClr val="bg1"/>
+              </a:solidFill>
+              <a:latin typeface="The Bold Font" pitchFamily="2" charset="0"/>
+            </a:endParaRPr>
+          </a:p>
+          <a:p>
+            <a:pPr marL="571500" indent="-571500">
+              <a:buFont typeface="Arial" panose="020B0604020202020204" pitchFamily="34" charset="0"/>
+              <a:buChar char="•"/>
+            </a:pPr>
+            <a:r>
+              <a:rPr lang="en-US" sz="3600" dirty="0">
+                <a:solidFill>
+                  <a:schemeClr val="bg1"/>
+                </a:solidFill>
+                <a:latin typeface="The Bold Font" pitchFamily="2" charset="0"/>
+              </a:rPr>
+              <a:t>Business plan</a:t>
+            </a:r>
+          </a:p>
+          <a:p>
+            <a:endParaRPr lang="en-US" sz="3600" dirty="0">
+              <a:solidFill>
+                <a:schemeClr val="bg1"/>
+              </a:solidFill>
+              <a:latin typeface="The Bold Font" pitchFamily="2" charset="0"/>
+            </a:endParaRPr>
+          </a:p>
+        </p:txBody>
+      </p:sp>
+      <p:pic>
+        <p:nvPicPr>
+          <p:cNvPr id="3078" name="Picture 6" descr="Image result for brain circuit symbol png">
+            <a:extLst>
+              <a:ext uri="{FF2B5EF4-FFF2-40B4-BE49-F238E27FC236}">
+                <a16:creationId xmlns:a16="http://schemas.microsoft.com/office/drawing/2014/main" id="{0C7F256D-B06D-40E2-BBEB-2F9DDD07EE4E}"/>
+              </a:ext>
+            </a:extLst>
+          </p:cNvPr>
+          <p:cNvPicPr>
+            <a:picLocks noChangeAspect="1" noChangeArrowheads="1"/>
+          </p:cNvPicPr>
+          <p:nvPr/>
+        </p:nvPicPr>
+        <p:blipFill>
+          <a:blip r:embed="rId2">
+            <a:extLst>
+              <a:ext uri="{28A0092B-C50C-407E-A947-70E740481C1C}">
+                <a14:useLocalDpi xmlns:a14="http://schemas.microsoft.com/office/drawing/2010/main" val="0"/>
+              </a:ext>
+            </a:extLst>
+          </a:blip>
+          <a:srcRect/>
+          <a:stretch>
+            <a:fillRect/>
+          </a:stretch>
+        </p:blipFill>
+        <p:spPr bwMode="auto">
+          <a:xfrm>
+            <a:off x="0" y="2038234"/>
+            <a:ext cx="5671668" cy="5132301"/>
+          </a:xfrm>
+          <a:prstGeom prst="rect">
+            <a:avLst/>
+          </a:prstGeom>
+          <a:noFill/>
+          <a:extLst>
+            <a:ext uri="{909E8E84-426E-40DD-AFC4-6F175D3DCCD1}">
+              <a14:hiddenFill xmlns:a14="http://schemas.microsoft.com/office/drawing/2010/main">
+                <a:solidFill>
+                  <a:srgbClr val="FFFFFF"/>
+                </a:solidFill>
+              </a14:hiddenFill>
+            </a:ext>
+          </a:extLst>
+        </p:spPr>
+      </p:pic>
+    </p:spTree>
+    <p:extLst>
+      <p:ext uri="{BB962C8B-B14F-4D97-AF65-F5344CB8AC3E}">
+        <p14:creationId xmlns:p14="http://schemas.microsoft.com/office/powerpoint/2010/main" val="4185682285"/>
+      </p:ext>
+    </p:extLst>
+  </p:cSld>
+  <p:clrMapOvr>
+    <a:masterClrMapping/>
+  </p:clrMapOvr>
+</p:sld>
+</file>
+
+<file path=ppt/slides/slide12.xml><?xml version="1.0" encoding="utf-8"?>
+<p:sld xmlns:a="http://schemas.openxmlformats.org/drawingml/2006/main" xmlns:r="http://schemas.openxmlformats.org/officeDocument/2006/relationships" xmlns:p="http://schemas.openxmlformats.org/presentationml/2006/main">
+  <p:cSld>
+    <p:spTree>
+      <p:nvGrpSpPr>
+        <p:cNvPr id="1" name=""/>
+        <p:cNvGrpSpPr/>
+        <p:nvPr/>
+      </p:nvGrpSpPr>
+      <p:grpSpPr>
+        <a:xfrm>
+          <a:off x="0" y="0"/>
+          <a:ext cx="0" cy="0"/>
+          <a:chOff x="0" y="0"/>
+          <a:chExt cx="0" cy="0"/>
+        </a:xfrm>
+      </p:grpSpPr>
       <p:graphicFrame>
         <p:nvGraphicFramePr>
           <p:cNvPr id="6" name="Chart 5">
@@ -8144,7 +9566,165 @@
 </p:sld>
 </file>
 
-<file path=ppt/slides/slide11.xml><?xml version="1.0" encoding="utf-8"?>
+<file path=ppt/slides/slide13.xml><?xml version="1.0" encoding="utf-8"?>
+<p:sld xmlns:a="http://schemas.openxmlformats.org/drawingml/2006/main" xmlns:r="http://schemas.openxmlformats.org/officeDocument/2006/relationships" xmlns:p="http://schemas.openxmlformats.org/presentationml/2006/main">
+  <p:cSld>
+    <p:spTree>
+      <p:nvGrpSpPr>
+        <p:cNvPr id="1" name=""/>
+        <p:cNvGrpSpPr/>
+        <p:nvPr/>
+      </p:nvGrpSpPr>
+      <p:grpSpPr>
+        <a:xfrm>
+          <a:off x="0" y="0"/>
+          <a:ext cx="0" cy="0"/>
+          <a:chOff x="0" y="0"/>
+          <a:chExt cx="0" cy="0"/>
+        </a:xfrm>
+      </p:grpSpPr>
+      <p:sp>
+        <p:nvSpPr>
+          <p:cNvPr id="5" name="Rectangle 4">
+            <a:extLst>
+              <a:ext uri="{FF2B5EF4-FFF2-40B4-BE49-F238E27FC236}">
+                <a16:creationId xmlns:a16="http://schemas.microsoft.com/office/drawing/2014/main" id="{0F0D65F7-04E3-4A32-A17C-43B689093526}"/>
+              </a:ext>
+            </a:extLst>
+          </p:cNvPr>
+          <p:cNvSpPr/>
+          <p:nvPr/>
+        </p:nvSpPr>
+        <p:spPr>
+          <a:xfrm>
+            <a:off x="0" y="0"/>
+            <a:ext cx="12192000" cy="6858000"/>
+          </a:xfrm>
+          <a:prstGeom prst="rect">
+            <a:avLst/>
+          </a:prstGeom>
+          <a:solidFill>
+            <a:srgbClr val="00CED1"/>
+          </a:solidFill>
+          <a:ln>
+            <a:noFill/>
+          </a:ln>
+        </p:spPr>
+        <p:style>
+          <a:lnRef idx="2">
+            <a:schemeClr val="accent1">
+              <a:shade val="50000"/>
+            </a:schemeClr>
+          </a:lnRef>
+          <a:fillRef idx="1">
+            <a:schemeClr val="accent1"/>
+          </a:fillRef>
+          <a:effectRef idx="0">
+            <a:schemeClr val="accent1"/>
+          </a:effectRef>
+          <a:fontRef idx="minor">
+            <a:schemeClr val="lt1"/>
+          </a:fontRef>
+        </p:style>
+        <p:txBody>
+          <a:bodyPr rtlCol="0" anchor="ctr"/>
+          <a:lstStyle/>
+          <a:p>
+            <a:pPr algn="ctr"/>
+            <a:endParaRPr lang="en-US" dirty="0"/>
+          </a:p>
+        </p:txBody>
+      </p:sp>
+      <p:sp>
+        <p:nvSpPr>
+          <p:cNvPr id="4" name="TextBox 3">
+            <a:extLst>
+              <a:ext uri="{FF2B5EF4-FFF2-40B4-BE49-F238E27FC236}">
+                <a16:creationId xmlns:a16="http://schemas.microsoft.com/office/drawing/2014/main" id="{5167E308-AE14-42DA-8463-7E5589E3C7E3}"/>
+              </a:ext>
+            </a:extLst>
+          </p:cNvPr>
+          <p:cNvSpPr txBox="1"/>
+          <p:nvPr/>
+        </p:nvSpPr>
+        <p:spPr>
+          <a:xfrm>
+            <a:off x="-1556425" y="0"/>
+            <a:ext cx="10086392" cy="1862048"/>
+          </a:xfrm>
+          <a:prstGeom prst="rect">
+            <a:avLst/>
+          </a:prstGeom>
+          <a:noFill/>
+          <a:effectLst>
+            <a:outerShdw blurRad="50800" dist="38100" algn="l" rotWithShape="0">
+              <a:prstClr val="black">
+                <a:alpha val="40000"/>
+              </a:prstClr>
+            </a:outerShdw>
+          </a:effectLst>
+        </p:spPr>
+        <p:txBody>
+          <a:bodyPr wrap="square" rtlCol="0">
+            <a:spAutoFit/>
+          </a:bodyPr>
+          <a:lstStyle/>
+          <a:p>
+            <a:pPr algn="ctr"/>
+            <a:r>
+              <a:rPr lang="en-US" sz="11500" dirty="0">
+                <a:solidFill>
+                  <a:schemeClr val="bg1"/>
+                </a:solidFill>
+                <a:latin typeface="The Bold Font" pitchFamily="2" charset="0"/>
+              </a:rPr>
+              <a:t>actuals</a:t>
+            </a:r>
+          </a:p>
+        </p:txBody>
+      </p:sp>
+      <p:graphicFrame>
+        <p:nvGraphicFramePr>
+          <p:cNvPr id="8" name="Chart 7">
+            <a:extLst>
+              <a:ext uri="{FF2B5EF4-FFF2-40B4-BE49-F238E27FC236}">
+                <a16:creationId xmlns:a16="http://schemas.microsoft.com/office/drawing/2014/main" id="{A1A7A00E-EB36-4427-B400-EDCB0EE26AF4}"/>
+              </a:ext>
+            </a:extLst>
+          </p:cNvPr>
+          <p:cNvGraphicFramePr/>
+          <p:nvPr>
+            <p:extLst>
+              <p:ext uri="{D42A27DB-BD31-4B8C-83A1-F6EECF244321}">
+                <p14:modId xmlns:p14="http://schemas.microsoft.com/office/powerpoint/2010/main" val="562608861"/>
+              </p:ext>
+            </p:extLst>
+          </p:nvPr>
+        </p:nvGraphicFramePr>
+        <p:xfrm>
+          <a:off x="208715" y="1439333"/>
+          <a:ext cx="8128000" cy="5418667"/>
+        </p:xfrm>
+        <a:graphic>
+          <a:graphicData uri="http://schemas.openxmlformats.org/drawingml/2006/chart">
+            <c:chart xmlns:c="http://schemas.openxmlformats.org/drawingml/2006/chart" xmlns:r="http://schemas.openxmlformats.org/officeDocument/2006/relationships" r:id="rId2"/>
+          </a:graphicData>
+        </a:graphic>
+      </p:graphicFrame>
+    </p:spTree>
+    <p:extLst>
+      <p:ext uri="{BB962C8B-B14F-4D97-AF65-F5344CB8AC3E}">
+        <p14:creationId xmlns:p14="http://schemas.microsoft.com/office/powerpoint/2010/main" val="2774734797"/>
+      </p:ext>
+    </p:extLst>
+  </p:cSld>
+  <p:clrMapOvr>
+    <a:masterClrMapping/>
+  </p:clrMapOvr>
+</p:sld>
+</file>
+
+<file path=ppt/slides/slide14.xml><?xml version="1.0" encoding="utf-8"?>
 <p:sld xmlns:a="http://schemas.openxmlformats.org/drawingml/2006/main" xmlns:r="http://schemas.openxmlformats.org/officeDocument/2006/relationships" xmlns:p="http://schemas.openxmlformats.org/presentationml/2006/main">
   <p:cSld>
     <p:spTree>
@@ -8408,7 +9988,7 @@
 </p:sld>
 </file>
 
-<file path=ppt/slides/slide12.xml><?xml version="1.0" encoding="utf-8"?>
+<file path=ppt/slides/slide15.xml><?xml version="1.0" encoding="utf-8"?>
 <p:sld xmlns:a="http://schemas.openxmlformats.org/drawingml/2006/main" xmlns:r="http://schemas.openxmlformats.org/officeDocument/2006/relationships" xmlns:p="http://schemas.openxmlformats.org/presentationml/2006/main">
   <p:cSld>
     <p:spTree>
@@ -8540,7 +10120,7 @@
         <p:spPr>
           <a:xfrm>
             <a:off x="424332" y="2673870"/>
-            <a:ext cx="5671669" cy="2862322"/>
+            <a:ext cx="5671669" cy="3970318"/>
           </a:xfrm>
           <a:prstGeom prst="rect">
             <a:avLst/>
@@ -8565,6 +10145,33 @@
                 <a:latin typeface="The Bold Font" pitchFamily="2" charset="0"/>
               </a:rPr>
               <a:t>Inconsistent location updates</a:t>
+            </a:r>
+          </a:p>
+          <a:p>
+            <a:pPr marL="571500" indent="-571500">
+              <a:buFont typeface="Arial" panose="020B0604020202020204" pitchFamily="34" charset="0"/>
+              <a:buChar char="•"/>
+            </a:pPr>
+            <a:endParaRPr lang="en-US" sz="3600" dirty="0">
+              <a:solidFill>
+                <a:schemeClr val="bg1"/>
+              </a:solidFill>
+              <a:latin typeface="The Bold Font" pitchFamily="2" charset="0"/>
+            </a:endParaRPr>
+          </a:p>
+          <a:p>
+            <a:pPr marL="571500" indent="-571500">
+              <a:buFont typeface="Arial" panose="020B0604020202020204" pitchFamily="34" charset="0"/>
+              <a:buChar char="•"/>
+            </a:pPr>
+            <a:r>
+              <a:rPr lang="en-US" sz="3600" dirty="0">
+                <a:solidFill>
+                  <a:schemeClr val="bg1"/>
+                </a:solidFill>
+                <a:latin typeface="The Bold Font" pitchFamily="2" charset="0"/>
+              </a:rPr>
+              <a:t>Auto login problem</a:t>
             </a:r>
           </a:p>
           <a:p>
@@ -8646,7 +10253,7 @@
 </p:sld>
 </file>
 
-<file path=ppt/slides/slide13.xml><?xml version="1.0" encoding="utf-8"?>
+<file path=ppt/slides/slide16.xml><?xml version="1.0" encoding="utf-8"?>
 <p:sld xmlns:a="http://schemas.openxmlformats.org/drawingml/2006/main" xmlns:r="http://schemas.openxmlformats.org/officeDocument/2006/relationships" xmlns:p="http://schemas.openxmlformats.org/presentationml/2006/main">
   <p:cSld>
     <p:spTree>
@@ -8764,7 +10371,7 @@
 </p:sld>
 </file>
 
-<file path=ppt/slides/slide14.xml><?xml version="1.0" encoding="utf-8"?>
+<file path=ppt/slides/slide17.xml><?xml version="1.0" encoding="utf-8"?>
 <p:sld xmlns:a="http://schemas.openxmlformats.org/drawingml/2006/main" xmlns:r="http://schemas.openxmlformats.org/officeDocument/2006/relationships" xmlns:p="http://schemas.openxmlformats.org/presentationml/2006/main">
   <p:cSld>
     <p:spTree>
@@ -9070,12 +10677,64 @@
           <a:chExt cx="0" cy="0"/>
         </a:xfrm>
       </p:grpSpPr>
+      <p:sp>
+        <p:nvSpPr>
+          <p:cNvPr id="11" name="Rectangle 10">
+            <a:extLst>
+              <a:ext uri="{FF2B5EF4-FFF2-40B4-BE49-F238E27FC236}">
+                <a16:creationId xmlns:a16="http://schemas.microsoft.com/office/drawing/2014/main" id="{0BD06750-E8D2-417A-8C7A-C8246E1B9CD0}"/>
+              </a:ext>
+            </a:extLst>
+          </p:cNvPr>
+          <p:cNvSpPr/>
+          <p:nvPr/>
+        </p:nvSpPr>
+        <p:spPr>
+          <a:xfrm>
+            <a:off x="4172829" y="1632857"/>
+            <a:ext cx="3303037" cy="5057192"/>
+          </a:xfrm>
+          <a:prstGeom prst="rect">
+            <a:avLst/>
+          </a:prstGeom>
+          <a:noFill/>
+          <a:ln w="57150">
+            <a:solidFill>
+              <a:srgbClr val="00CED1"/>
+            </a:solidFill>
+          </a:ln>
+        </p:spPr>
+        <p:style>
+          <a:lnRef idx="2">
+            <a:schemeClr val="accent1">
+              <a:shade val="50000"/>
+            </a:schemeClr>
+          </a:lnRef>
+          <a:fillRef idx="1">
+            <a:schemeClr val="accent1"/>
+          </a:fillRef>
+          <a:effectRef idx="0">
+            <a:schemeClr val="accent1"/>
+          </a:effectRef>
+          <a:fontRef idx="minor">
+            <a:schemeClr val="lt1"/>
+          </a:fontRef>
+        </p:style>
+        <p:txBody>
+          <a:bodyPr rtlCol="0" anchor="ctr"/>
+          <a:lstStyle/>
+          <a:p>
+            <a:pPr algn="ctr"/>
+            <a:endParaRPr lang="en-US"/>
+          </a:p>
+        </p:txBody>
+      </p:sp>
       <p:pic>
         <p:nvPicPr>
-          <p:cNvPr id="6" name="Picture 5">
+          <p:cNvPr id="5" name="Picture 4">
             <a:extLst>
               <a:ext uri="{FF2B5EF4-FFF2-40B4-BE49-F238E27FC236}">
-                <a16:creationId xmlns:a16="http://schemas.microsoft.com/office/drawing/2014/main" id="{CEDA9E0B-6E3E-4042-AF5B-B506CE19F055}"/>
+                <a16:creationId xmlns:a16="http://schemas.microsoft.com/office/drawing/2014/main" id="{F9CEC93B-3D47-4F94-AB9A-765B5FB85439}"/>
               </a:ext>
             </a:extLst>
           </p:cNvPr>
@@ -9098,8 +10757,44 @@
         </p:blipFill>
         <p:spPr>
           <a:xfrm>
-            <a:off x="675073" y="2690812"/>
-            <a:ext cx="1476375" cy="1476375"/>
+            <a:off x="4214398" y="1916050"/>
+            <a:ext cx="3114378" cy="4453484"/>
+          </a:xfrm>
+          <a:prstGeom prst="rect">
+            <a:avLst/>
+          </a:prstGeom>
+        </p:spPr>
+      </p:pic>
+      <p:pic>
+        <p:nvPicPr>
+          <p:cNvPr id="6" name="Picture 5">
+            <a:extLst>
+              <a:ext uri="{FF2B5EF4-FFF2-40B4-BE49-F238E27FC236}">
+                <a16:creationId xmlns:a16="http://schemas.microsoft.com/office/drawing/2014/main" id="{CEDA9E0B-6E3E-4042-AF5B-B506CE19F055}"/>
+              </a:ext>
+            </a:extLst>
+          </p:cNvPr>
+          <p:cNvPicPr>
+            <a:picLocks noChangeAspect="1"/>
+          </p:cNvPicPr>
+          <p:nvPr/>
+        </p:nvPicPr>
+        <p:blipFill>
+          <a:blip r:embed="rId3">
+            <a:extLst>
+              <a:ext uri="{28A0092B-C50C-407E-A947-70E740481C1C}">
+                <a14:useLocalDpi xmlns:a14="http://schemas.microsoft.com/office/drawing/2010/main" val="0"/>
+              </a:ext>
+            </a:extLst>
+          </a:blip>
+          <a:stretch>
+            <a:fillRect/>
+          </a:stretch>
+        </p:blipFill>
+        <p:spPr>
+          <a:xfrm>
+            <a:off x="9465278" y="2808973"/>
+            <a:ext cx="2103434" cy="2103434"/>
           </a:xfrm>
           <a:prstGeom prst="rect">
             <a:avLst/>
@@ -9121,7 +10816,7 @@
           <p:nvPr/>
         </p:nvPicPr>
         <p:blipFill>
-          <a:blip r:embed="rId3">
+          <a:blip r:embed="rId4">
             <a:extLst>
               <a:ext uri="{28A0092B-C50C-407E-A947-70E740481C1C}">
                 <a14:useLocalDpi xmlns:a14="http://schemas.microsoft.com/office/drawing/2010/main" val="0"/>
@@ -9134,8 +10829,8 @@
         </p:blipFill>
         <p:spPr>
           <a:xfrm>
-            <a:off x="10182225" y="2761649"/>
-            <a:ext cx="1334702" cy="1334702"/>
+            <a:off x="376191" y="3186268"/>
+            <a:ext cx="1758473" cy="1758473"/>
           </a:xfrm>
           <a:prstGeom prst="rect">
             <a:avLst/>
@@ -9187,6 +10882,114 @@
               </a:rPr>
               <a:t>Solution design</a:t>
             </a:r>
+          </a:p>
+        </p:txBody>
+      </p:sp>
+      <p:sp>
+        <p:nvSpPr>
+          <p:cNvPr id="9" name="Arrow: Right 8">
+            <a:extLst>
+              <a:ext uri="{FF2B5EF4-FFF2-40B4-BE49-F238E27FC236}">
+                <a16:creationId xmlns:a16="http://schemas.microsoft.com/office/drawing/2014/main" id="{F806BD2A-5ECE-49C8-A858-6A102C089133}"/>
+              </a:ext>
+            </a:extLst>
+          </p:cNvPr>
+          <p:cNvSpPr/>
+          <p:nvPr/>
+        </p:nvSpPr>
+        <p:spPr>
+          <a:xfrm>
+            <a:off x="2388637" y="3554963"/>
+            <a:ext cx="1530219" cy="998376"/>
+          </a:xfrm>
+          <a:prstGeom prst="rightArrow">
+            <a:avLst/>
+          </a:prstGeom>
+          <a:solidFill>
+            <a:srgbClr val="00CED1"/>
+          </a:solidFill>
+          <a:ln>
+            <a:solidFill>
+              <a:srgbClr val="00CED1"/>
+            </a:solidFill>
+          </a:ln>
+        </p:spPr>
+        <p:style>
+          <a:lnRef idx="2">
+            <a:schemeClr val="accent1">
+              <a:shade val="50000"/>
+            </a:schemeClr>
+          </a:lnRef>
+          <a:fillRef idx="1">
+            <a:schemeClr val="accent1"/>
+          </a:fillRef>
+          <a:effectRef idx="0">
+            <a:schemeClr val="accent1"/>
+          </a:effectRef>
+          <a:fontRef idx="minor">
+            <a:schemeClr val="lt1"/>
+          </a:fontRef>
+        </p:style>
+        <p:txBody>
+          <a:bodyPr rtlCol="0" anchor="ctr"/>
+          <a:lstStyle/>
+          <a:p>
+            <a:pPr algn="ctr"/>
+            <a:endParaRPr lang="en-US"/>
+          </a:p>
+        </p:txBody>
+      </p:sp>
+      <p:sp>
+        <p:nvSpPr>
+          <p:cNvPr id="10" name="Arrow: Right 9">
+            <a:extLst>
+              <a:ext uri="{FF2B5EF4-FFF2-40B4-BE49-F238E27FC236}">
+                <a16:creationId xmlns:a16="http://schemas.microsoft.com/office/drawing/2014/main" id="{42E151D4-9941-42FC-B712-159CC257FC93}"/>
+              </a:ext>
+            </a:extLst>
+          </p:cNvPr>
+          <p:cNvSpPr/>
+          <p:nvPr/>
+        </p:nvSpPr>
+        <p:spPr>
+          <a:xfrm rot="10800000">
+            <a:off x="7729839" y="3429000"/>
+            <a:ext cx="1330186" cy="1001090"/>
+          </a:xfrm>
+          <a:prstGeom prst="rightArrow">
+            <a:avLst/>
+          </a:prstGeom>
+          <a:solidFill>
+            <a:srgbClr val="00CED1"/>
+          </a:solidFill>
+          <a:ln>
+            <a:solidFill>
+              <a:srgbClr val="00CED1"/>
+            </a:solidFill>
+          </a:ln>
+        </p:spPr>
+        <p:style>
+          <a:lnRef idx="2">
+            <a:schemeClr val="accent1">
+              <a:shade val="50000"/>
+            </a:schemeClr>
+          </a:lnRef>
+          <a:fillRef idx="1">
+            <a:schemeClr val="accent1"/>
+          </a:fillRef>
+          <a:effectRef idx="0">
+            <a:schemeClr val="accent1"/>
+          </a:effectRef>
+          <a:fontRef idx="minor">
+            <a:schemeClr val="lt1"/>
+          </a:fontRef>
+        </p:style>
+        <p:txBody>
+          <a:bodyPr rtlCol="0" anchor="ctr"/>
+          <a:lstStyle/>
+          <a:p>
+            <a:pPr algn="ctr"/>
+            <a:endParaRPr lang="en-US"/>
           </a:p>
         </p:txBody>
       </p:sp>
@@ -10010,463 +11813,6 @@
           <a:chExt cx="0" cy="0"/>
         </a:xfrm>
       </p:grpSpPr>
-      <p:pic>
-        <p:nvPicPr>
-          <p:cNvPr id="3" name="Picture 2" descr="A close up of a logo&#10;&#10;Description automatically generated">
-            <a:extLst>
-              <a:ext uri="{FF2B5EF4-FFF2-40B4-BE49-F238E27FC236}">
-                <a16:creationId xmlns:a16="http://schemas.microsoft.com/office/drawing/2014/main" id="{7783D93B-D516-41EB-B138-187FBA2FBE6F}"/>
-              </a:ext>
-            </a:extLst>
-          </p:cNvPr>
-          <p:cNvPicPr>
-            <a:picLocks noChangeAspect="1"/>
-          </p:cNvPicPr>
-          <p:nvPr/>
-        </p:nvPicPr>
-        <p:blipFill>
-          <a:blip r:embed="rId2">
-            <a:extLst>
-              <a:ext uri="{28A0092B-C50C-407E-A947-70E740481C1C}">
-                <a14:useLocalDpi xmlns:a14="http://schemas.microsoft.com/office/drawing/2010/main" val="0"/>
-              </a:ext>
-            </a:extLst>
-          </a:blip>
-          <a:stretch>
-            <a:fillRect/>
-          </a:stretch>
-        </p:blipFill>
-        <p:spPr>
-          <a:xfrm>
-            <a:off x="0" y="-106040"/>
-            <a:ext cx="2019300" cy="2019300"/>
-          </a:xfrm>
-          <a:prstGeom prst="rect">
-            <a:avLst/>
-          </a:prstGeom>
-        </p:spPr>
-      </p:pic>
-      <p:sp>
-        <p:nvSpPr>
-          <p:cNvPr id="5" name="TextBox 4">
-            <a:extLst>
-              <a:ext uri="{FF2B5EF4-FFF2-40B4-BE49-F238E27FC236}">
-                <a16:creationId xmlns:a16="http://schemas.microsoft.com/office/drawing/2014/main" id="{BF221FEC-E642-45EF-AE68-A8CABBD39594}"/>
-              </a:ext>
-            </a:extLst>
-          </p:cNvPr>
-          <p:cNvSpPr txBox="1"/>
-          <p:nvPr/>
-        </p:nvSpPr>
-        <p:spPr>
-          <a:xfrm>
-            <a:off x="1535672" y="51212"/>
-            <a:ext cx="10558510" cy="1862048"/>
-          </a:xfrm>
-          <a:prstGeom prst="rect">
-            <a:avLst/>
-          </a:prstGeom>
-          <a:noFill/>
-          <a:effectLst>
-            <a:outerShdw blurRad="50800" dist="38100" algn="l" rotWithShape="0">
-              <a:prstClr val="black">
-                <a:alpha val="40000"/>
-              </a:prstClr>
-            </a:outerShdw>
-          </a:effectLst>
-        </p:spPr>
-        <p:txBody>
-          <a:bodyPr wrap="square" rtlCol="0">
-            <a:spAutoFit/>
-          </a:bodyPr>
-          <a:lstStyle/>
-          <a:p>
-            <a:pPr algn="ctr"/>
-            <a:r>
-              <a:rPr lang="en-US" sz="11500" dirty="0">
-                <a:solidFill>
-                  <a:srgbClr val="00CED1"/>
-                </a:solidFill>
-                <a:latin typeface="The Bold Font" pitchFamily="2" charset="0"/>
-              </a:rPr>
-              <a:t>deliverables</a:t>
-            </a:r>
-          </a:p>
-        </p:txBody>
-      </p:sp>
-      <p:sp>
-        <p:nvSpPr>
-          <p:cNvPr id="7" name="TextBox 6">
-            <a:extLst>
-              <a:ext uri="{FF2B5EF4-FFF2-40B4-BE49-F238E27FC236}">
-                <a16:creationId xmlns:a16="http://schemas.microsoft.com/office/drawing/2014/main" id="{C7A737D9-7C89-4387-B329-7DD818414DFF}"/>
-              </a:ext>
-            </a:extLst>
-          </p:cNvPr>
-          <p:cNvSpPr txBox="1"/>
-          <p:nvPr/>
-        </p:nvSpPr>
-        <p:spPr>
-          <a:xfrm>
-            <a:off x="408537" y="3112525"/>
-            <a:ext cx="2952032" cy="1569660"/>
-          </a:xfrm>
-          <a:prstGeom prst="rect">
-            <a:avLst/>
-          </a:prstGeom>
-          <a:noFill/>
-        </p:spPr>
-        <p:txBody>
-          <a:bodyPr wrap="square" rtlCol="0">
-            <a:spAutoFit/>
-          </a:bodyPr>
-          <a:lstStyle/>
-          <a:p>
-            <a:r>
-              <a:rPr lang="en-US" sz="2400" dirty="0">
-                <a:solidFill>
-                  <a:srgbClr val="00B050"/>
-                </a:solidFill>
-                <a:latin typeface="The Bold Font" pitchFamily="2" charset="0"/>
-              </a:rPr>
-              <a:t>Green = delivered</a:t>
-            </a:r>
-            <a:br>
-              <a:rPr lang="en-US" sz="2400" dirty="0">
-                <a:solidFill>
-                  <a:srgbClr val="00CED1"/>
-                </a:solidFill>
-                <a:latin typeface="The Bold Font" pitchFamily="2" charset="0"/>
-              </a:rPr>
-            </a:br>
-            <a:r>
-              <a:rPr lang="en-US" sz="2400" dirty="0">
-                <a:solidFill>
-                  <a:srgbClr val="FF8C00"/>
-                </a:solidFill>
-                <a:latin typeface="The Bold Font" pitchFamily="2" charset="0"/>
-              </a:rPr>
-              <a:t>orange = issues with delivery</a:t>
-            </a:r>
-          </a:p>
-          <a:p>
-            <a:r>
-              <a:rPr lang="en-US" sz="2400" dirty="0">
-                <a:solidFill>
-                  <a:srgbClr val="FF0000"/>
-                </a:solidFill>
-                <a:latin typeface="The Bold Font" pitchFamily="2" charset="0"/>
-              </a:rPr>
-              <a:t>Red = incomplete</a:t>
-            </a:r>
-          </a:p>
-        </p:txBody>
-      </p:sp>
-      <p:sp>
-        <p:nvSpPr>
-          <p:cNvPr id="4" name="Rectangle 3">
-            <a:extLst>
-              <a:ext uri="{FF2B5EF4-FFF2-40B4-BE49-F238E27FC236}">
-                <a16:creationId xmlns:a16="http://schemas.microsoft.com/office/drawing/2014/main" id="{6BD9DB6D-DA56-41A2-BCA6-7C9DD1775A83}"/>
-              </a:ext>
-            </a:extLst>
-          </p:cNvPr>
-          <p:cNvSpPr/>
-          <p:nvPr/>
-        </p:nvSpPr>
-        <p:spPr>
-          <a:xfrm>
-            <a:off x="3840653" y="1913260"/>
-            <a:ext cx="8478603" cy="4801314"/>
-          </a:xfrm>
-          <a:prstGeom prst="rect">
-            <a:avLst/>
-          </a:prstGeom>
-        </p:spPr>
-        <p:txBody>
-          <a:bodyPr wrap="none">
-            <a:spAutoFit/>
-          </a:bodyPr>
-          <a:lstStyle/>
-          <a:p>
-            <a:pPr marL="285750" indent="-285750">
-              <a:buFont typeface="Arial" panose="020B0604020202020204" pitchFamily="34" charset="0"/>
-              <a:buChar char="•"/>
-            </a:pPr>
-            <a:r>
-              <a:rPr lang="en-US" dirty="0">
-                <a:solidFill>
-                  <a:srgbClr val="00B050"/>
-                </a:solidFill>
-                <a:latin typeface="The Bold Font" pitchFamily="2" charset="0"/>
-              </a:rPr>
-              <a:t>Businesses can upload images for promotions</a:t>
-            </a:r>
-            <a:br>
-              <a:rPr lang="en-US" dirty="0">
-                <a:solidFill>
-                  <a:srgbClr val="00B050"/>
-                </a:solidFill>
-                <a:latin typeface="The Bold Font" pitchFamily="2" charset="0"/>
-              </a:rPr>
-            </a:br>
-            <a:endParaRPr lang="en-US" dirty="0">
-              <a:solidFill>
-                <a:srgbClr val="00B050"/>
-              </a:solidFill>
-              <a:latin typeface="The Bold Font" pitchFamily="2" charset="0"/>
-            </a:endParaRPr>
-          </a:p>
-          <a:p>
-            <a:pPr marL="285750" indent="-285750">
-              <a:buFont typeface="Arial" panose="020B0604020202020204" pitchFamily="34" charset="0"/>
-              <a:buChar char="•"/>
-            </a:pPr>
-            <a:r>
-              <a:rPr lang="en-US" dirty="0">
-                <a:solidFill>
-                  <a:srgbClr val="00B050"/>
-                </a:solidFill>
-                <a:latin typeface="The Bold Font" pitchFamily="2" charset="0"/>
-              </a:rPr>
-              <a:t>Monthly </a:t>
-            </a:r>
-            <a:r>
-              <a:rPr lang="en-US" dirty="0" err="1">
-                <a:solidFill>
-                  <a:srgbClr val="00B050"/>
-                </a:solidFill>
-                <a:latin typeface="The Bold Font" pitchFamily="2" charset="0"/>
-              </a:rPr>
-              <a:t>kpi</a:t>
-            </a:r>
-            <a:r>
-              <a:rPr lang="en-US" dirty="0">
-                <a:solidFill>
-                  <a:srgbClr val="00B050"/>
-                </a:solidFill>
-                <a:latin typeface="The Bold Font" pitchFamily="2" charset="0"/>
-              </a:rPr>
-              <a:t> report for administrator</a:t>
-            </a:r>
-          </a:p>
-          <a:p>
-            <a:pPr marL="285750" indent="-285750">
-              <a:buFont typeface="Arial" panose="020B0604020202020204" pitchFamily="34" charset="0"/>
-              <a:buChar char="•"/>
-            </a:pPr>
-            <a:endParaRPr lang="en-US" dirty="0">
-              <a:solidFill>
-                <a:srgbClr val="00B050"/>
-              </a:solidFill>
-              <a:latin typeface="The Bold Font" pitchFamily="2" charset="0"/>
-            </a:endParaRPr>
-          </a:p>
-          <a:p>
-            <a:pPr marL="285750" indent="-285750">
-              <a:buFont typeface="Arial" panose="020B0604020202020204" pitchFamily="34" charset="0"/>
-              <a:buChar char="•"/>
-            </a:pPr>
-            <a:r>
-              <a:rPr lang="en-US" dirty="0">
-                <a:solidFill>
-                  <a:srgbClr val="00B050"/>
-                </a:solidFill>
-                <a:latin typeface="The Bold Font" pitchFamily="2" charset="0"/>
-              </a:rPr>
-              <a:t>Analytics: total visitors/month, new vs. old customers, visitors/tier</a:t>
-            </a:r>
-          </a:p>
-          <a:p>
-            <a:pPr marL="285750" indent="-285750">
-              <a:buFont typeface="Arial" panose="020B0604020202020204" pitchFamily="34" charset="0"/>
-              <a:buChar char="•"/>
-            </a:pPr>
-            <a:endParaRPr lang="en-US" dirty="0">
-              <a:solidFill>
-                <a:srgbClr val="00B050"/>
-              </a:solidFill>
-              <a:latin typeface="The Bold Font" pitchFamily="2" charset="0"/>
-            </a:endParaRPr>
-          </a:p>
-          <a:p>
-            <a:pPr marL="285750" indent="-285750">
-              <a:buFont typeface="Arial" panose="020B0604020202020204" pitchFamily="34" charset="0"/>
-              <a:buChar char="•"/>
-            </a:pPr>
-            <a:r>
-              <a:rPr lang="en-US" dirty="0">
-                <a:solidFill>
-                  <a:srgbClr val="00B050"/>
-                </a:solidFill>
-                <a:latin typeface="The Bold Font" pitchFamily="2" charset="0"/>
-              </a:rPr>
-              <a:t>Administrator component</a:t>
-            </a:r>
-          </a:p>
-          <a:p>
-            <a:pPr marL="285750" indent="-285750">
-              <a:buFont typeface="Arial" panose="020B0604020202020204" pitchFamily="34" charset="0"/>
-              <a:buChar char="•"/>
-            </a:pPr>
-            <a:endParaRPr lang="en-US" dirty="0">
-              <a:solidFill>
-                <a:srgbClr val="00B050"/>
-              </a:solidFill>
-              <a:latin typeface="The Bold Font" pitchFamily="2" charset="0"/>
-            </a:endParaRPr>
-          </a:p>
-          <a:p>
-            <a:pPr marL="285750" indent="-285750">
-              <a:buFont typeface="Arial" panose="020B0604020202020204" pitchFamily="34" charset="0"/>
-              <a:buChar char="•"/>
-            </a:pPr>
-            <a:r>
-              <a:rPr lang="en-US" dirty="0">
-                <a:solidFill>
-                  <a:srgbClr val="00B050"/>
-                </a:solidFill>
-                <a:latin typeface="The Bold Font" pitchFamily="2" charset="0"/>
-              </a:rPr>
-              <a:t>User tiers</a:t>
-            </a:r>
-          </a:p>
-          <a:p>
-            <a:pPr marL="285750" indent="-285750">
-              <a:buFont typeface="Arial" panose="020B0604020202020204" pitchFamily="34" charset="0"/>
-              <a:buChar char="•"/>
-            </a:pPr>
-            <a:endParaRPr lang="en-US" dirty="0">
-              <a:solidFill>
-                <a:srgbClr val="00B050"/>
-              </a:solidFill>
-              <a:latin typeface="The Bold Font" pitchFamily="2" charset="0"/>
-            </a:endParaRPr>
-          </a:p>
-          <a:p>
-            <a:pPr marL="285750" indent="-285750">
-              <a:buFont typeface="Arial" panose="020B0604020202020204" pitchFamily="34" charset="0"/>
-              <a:buChar char="•"/>
-            </a:pPr>
-            <a:r>
-              <a:rPr lang="en-US" dirty="0">
-                <a:solidFill>
-                  <a:srgbClr val="00B050"/>
-                </a:solidFill>
-                <a:latin typeface="The Bold Font" pitchFamily="2" charset="0"/>
-              </a:rPr>
-              <a:t>Miscellaneous visual changes</a:t>
-            </a:r>
-          </a:p>
-          <a:p>
-            <a:pPr marL="285750" indent="-285750">
-              <a:buFont typeface="Arial" panose="020B0604020202020204" pitchFamily="34" charset="0"/>
-              <a:buChar char="•"/>
-            </a:pPr>
-            <a:endParaRPr lang="en-US" dirty="0">
-              <a:solidFill>
-                <a:srgbClr val="00B050"/>
-              </a:solidFill>
-              <a:latin typeface="The Bold Font" pitchFamily="2" charset="0"/>
-            </a:endParaRPr>
-          </a:p>
-          <a:p>
-            <a:pPr marL="285750" indent="-285750">
-              <a:buFont typeface="Arial" panose="020B0604020202020204" pitchFamily="34" charset="0"/>
-              <a:buChar char="•"/>
-            </a:pPr>
-            <a:r>
-              <a:rPr lang="en-US" dirty="0">
-                <a:solidFill>
-                  <a:srgbClr val="00B050"/>
-                </a:solidFill>
-                <a:latin typeface="The Bold Font" pitchFamily="2" charset="0"/>
-              </a:rPr>
-              <a:t>Minor functional changes</a:t>
-            </a:r>
-          </a:p>
-          <a:p>
-            <a:pPr marL="285750" indent="-285750">
-              <a:buFont typeface="Arial" panose="020B0604020202020204" pitchFamily="34" charset="0"/>
-              <a:buChar char="•"/>
-            </a:pPr>
-            <a:endParaRPr lang="en-US" dirty="0">
-              <a:solidFill>
-                <a:srgbClr val="00B050"/>
-              </a:solidFill>
-              <a:latin typeface="The Bold Font" pitchFamily="2" charset="0"/>
-            </a:endParaRPr>
-          </a:p>
-          <a:p>
-            <a:pPr marL="285750" indent="-285750">
-              <a:buFont typeface="Arial" panose="020B0604020202020204" pitchFamily="34" charset="0"/>
-              <a:buChar char="•"/>
-            </a:pPr>
-            <a:r>
-              <a:rPr lang="en-US" dirty="0">
-                <a:solidFill>
-                  <a:srgbClr val="00B050"/>
-                </a:solidFill>
-                <a:latin typeface="The Bold Font" pitchFamily="2" charset="0"/>
-              </a:rPr>
-              <a:t>Aesthetic  update</a:t>
-            </a:r>
-          </a:p>
-          <a:p>
-            <a:pPr marL="285750" indent="-285750">
-              <a:buFont typeface="Arial" panose="020B0604020202020204" pitchFamily="34" charset="0"/>
-              <a:buChar char="•"/>
-            </a:pPr>
-            <a:endParaRPr lang="en-US" dirty="0">
-              <a:solidFill>
-                <a:srgbClr val="00B050"/>
-              </a:solidFill>
-              <a:latin typeface="The Bold Font" pitchFamily="2" charset="0"/>
-            </a:endParaRPr>
-          </a:p>
-          <a:p>
-            <a:r>
-              <a:rPr lang="en-US" dirty="0">
-                <a:solidFill>
-                  <a:srgbClr val="FF8C00"/>
-                </a:solidFill>
-                <a:latin typeface="The Bold Font" pitchFamily="2" charset="0"/>
-              </a:rPr>
-              <a:t>*there are A FEW KNOWN BUGS WITH ITEMS NOT LISTED HERE</a:t>
-            </a:r>
-          </a:p>
-        </p:txBody>
-      </p:sp>
-    </p:spTree>
-    <p:extLst>
-      <p:ext uri="{BB962C8B-B14F-4D97-AF65-F5344CB8AC3E}">
-        <p14:creationId xmlns:p14="http://schemas.microsoft.com/office/powerpoint/2010/main" val="4028998512"/>
-      </p:ext>
-    </p:extLst>
-  </p:cSld>
-  <p:clrMapOvr>
-    <a:masterClrMapping/>
-  </p:clrMapOvr>
-</p:sld>
-</file>
-
-<file path=ppt/slides/slide7.xml><?xml version="1.0" encoding="utf-8"?>
-<p:sld xmlns:a="http://schemas.openxmlformats.org/drawingml/2006/main" xmlns:r="http://schemas.openxmlformats.org/officeDocument/2006/relationships" xmlns:p="http://schemas.openxmlformats.org/presentationml/2006/main">
-  <p:cSld>
-    <p:spTree>
-      <p:nvGrpSpPr>
-        <p:cNvPr id="1" name=""/>
-        <p:cNvGrpSpPr/>
-        <p:nvPr/>
-      </p:nvGrpSpPr>
-      <p:grpSpPr>
-        <a:xfrm>
-          <a:off x="0" y="0"/>
-          <a:ext cx="0" cy="0"/>
-          <a:chOff x="0" y="0"/>
-          <a:chExt cx="0" cy="0"/>
-        </a:xfrm>
-      </p:grpSpPr>
       <p:sp>
         <p:nvSpPr>
           <p:cNvPr id="5" name="TextBox 4">
@@ -10610,7 +11956,7 @@
 </p:sld>
 </file>
 
-<file path=ppt/slides/slide8.xml><?xml version="1.0" encoding="utf-8"?>
+<file path=ppt/slides/slide7.xml><?xml version="1.0" encoding="utf-8"?>
 <p:sld xmlns:a="http://schemas.openxmlformats.org/drawingml/2006/main" xmlns:r="http://schemas.openxmlformats.org/officeDocument/2006/relationships" xmlns:p="http://schemas.openxmlformats.org/presentationml/2006/main">
   <p:cSld>
     <p:spTree>
@@ -10627,64 +11973,42 @@
           <a:chExt cx="0" cy="0"/>
         </a:xfrm>
       </p:grpSpPr>
-      <p:sp>
-        <p:nvSpPr>
-          <p:cNvPr id="9" name="Rectangle 8">
+      <p:pic>
+        <p:nvPicPr>
+          <p:cNvPr id="10" name="Picture 9">
             <a:extLst>
               <a:ext uri="{FF2B5EF4-FFF2-40B4-BE49-F238E27FC236}">
-                <a16:creationId xmlns:a16="http://schemas.microsoft.com/office/drawing/2014/main" id="{5517070E-EEBC-496B-B363-0FF9C639F972}"/>
+                <a16:creationId xmlns:a16="http://schemas.microsoft.com/office/drawing/2014/main" id="{BFD4797F-2AA6-43CB-9A0D-86FA8500D968}"/>
               </a:ext>
             </a:extLst>
           </p:cNvPr>
-          <p:cNvSpPr/>
+          <p:cNvPicPr>
+            <a:picLocks noChangeAspect="1"/>
+          </p:cNvPicPr>
           <p:nvPr/>
-        </p:nvSpPr>
+        </p:nvPicPr>
+        <p:blipFill>
+          <a:blip r:embed="rId2"/>
+          <a:stretch>
+            <a:fillRect/>
+          </a:stretch>
+        </p:blipFill>
         <p:spPr>
           <a:xfrm>
-            <a:off x="0" y="0"/>
-            <a:ext cx="12192000" cy="6858000"/>
+            <a:off x="2631459" y="1692315"/>
+            <a:ext cx="6257988" cy="4624510"/>
           </a:xfrm>
           <a:prstGeom prst="rect">
             <a:avLst/>
           </a:prstGeom>
-          <a:solidFill>
-            <a:srgbClr val="00CED1"/>
-          </a:solidFill>
-          <a:ln>
-            <a:noFill/>
-          </a:ln>
         </p:spPr>
-        <p:style>
-          <a:lnRef idx="2">
-            <a:schemeClr val="accent1">
-              <a:shade val="50000"/>
-            </a:schemeClr>
-          </a:lnRef>
-          <a:fillRef idx="1">
-            <a:schemeClr val="accent1"/>
-          </a:fillRef>
-          <a:effectRef idx="0">
-            <a:schemeClr val="accent1"/>
-          </a:effectRef>
-          <a:fontRef idx="minor">
-            <a:schemeClr val="lt1"/>
-          </a:fontRef>
-        </p:style>
-        <p:txBody>
-          <a:bodyPr rtlCol="0" anchor="ctr"/>
-          <a:lstStyle/>
-          <a:p>
-            <a:pPr algn="ctr"/>
-            <a:endParaRPr lang="en-US" dirty="0"/>
-          </a:p>
-        </p:txBody>
-      </p:sp>
+      </p:pic>
       <p:sp>
         <p:nvSpPr>
-          <p:cNvPr id="5" name="TextBox 4">
+          <p:cNvPr id="11" name="TextBox 10">
             <a:extLst>
               <a:ext uri="{FF2B5EF4-FFF2-40B4-BE49-F238E27FC236}">
-                <a16:creationId xmlns:a16="http://schemas.microsoft.com/office/drawing/2014/main" id="{BF221FEC-E642-45EF-AE68-A8CABBD39594}"/>
+                <a16:creationId xmlns:a16="http://schemas.microsoft.com/office/drawing/2014/main" id="{F3BA91E1-48DF-4E2A-86B1-20745460F066}"/>
               </a:ext>
             </a:extLst>
           </p:cNvPr>
@@ -10693,8 +12017,8 @@
         </p:nvSpPr>
         <p:spPr>
           <a:xfrm>
-            <a:off x="1943048" y="179816"/>
-            <a:ext cx="6676010" cy="1862048"/>
+            <a:off x="1898136" y="-167598"/>
+            <a:ext cx="7972149" cy="2092881"/>
           </a:xfrm>
           <a:prstGeom prst="rect">
             <a:avLst/>
@@ -10716,23 +12040,59 @@
           <a:p>
             <a:pPr algn="ctr"/>
             <a:r>
-              <a:rPr lang="en-US" sz="11500" dirty="0">
+              <a:rPr lang="en-US" sz="13000" dirty="0" err="1">
                 <a:solidFill>
-                  <a:schemeClr val="bg1"/>
+                  <a:srgbClr val="FF8C00"/>
                 </a:solidFill>
                 <a:latin typeface="The Bold Font" pitchFamily="2" charset="0"/>
               </a:rPr>
-              <a:t>testing</a:t>
+              <a:t>kpi</a:t>
             </a:r>
+            <a:endParaRPr lang="en-US" sz="13000" dirty="0">
+              <a:solidFill>
+                <a:srgbClr val="FF8C00"/>
+              </a:solidFill>
+              <a:latin typeface="The Bold Font" pitchFamily="2" charset="0"/>
+            </a:endParaRPr>
           </a:p>
         </p:txBody>
       </p:sp>
+    </p:spTree>
+    <p:extLst>
+      <p:ext uri="{BB962C8B-B14F-4D97-AF65-F5344CB8AC3E}">
+        <p14:creationId xmlns:p14="http://schemas.microsoft.com/office/powerpoint/2010/main" val="3937277985"/>
+      </p:ext>
+    </p:extLst>
+  </p:cSld>
+  <p:clrMapOvr>
+    <a:masterClrMapping/>
+  </p:clrMapOvr>
+</p:sld>
+</file>
+
+<file path=ppt/slides/slide8.xml><?xml version="1.0" encoding="utf-8"?>
+<p:sld xmlns:a="http://schemas.openxmlformats.org/drawingml/2006/main" xmlns:r="http://schemas.openxmlformats.org/officeDocument/2006/relationships" xmlns:p="http://schemas.openxmlformats.org/presentationml/2006/main">
+  <p:cSld>
+    <p:spTree>
+      <p:nvGrpSpPr>
+        <p:cNvPr id="1" name=""/>
+        <p:cNvGrpSpPr/>
+        <p:nvPr/>
+      </p:nvGrpSpPr>
+      <p:grpSpPr>
+        <a:xfrm>
+          <a:off x="0" y="0"/>
+          <a:ext cx="0" cy="0"/>
+          <a:chOff x="0" y="0"/>
+          <a:chExt cx="0" cy="0"/>
+        </a:xfrm>
+      </p:grpSpPr>
       <p:pic>
         <p:nvPicPr>
-          <p:cNvPr id="6" name="Picture 5" descr="A close up of a logo&#10;&#10;Description automatically generated">
+          <p:cNvPr id="2" name="Picture 1">
             <a:extLst>
               <a:ext uri="{FF2B5EF4-FFF2-40B4-BE49-F238E27FC236}">
-                <a16:creationId xmlns:a16="http://schemas.microsoft.com/office/drawing/2014/main" id="{6ACACFD9-BE4E-4D16-A1C9-1FC45C5DD517}"/>
+                <a16:creationId xmlns:a16="http://schemas.microsoft.com/office/drawing/2014/main" id="{710A4D0E-835C-4917-A7B4-3A680942E627}"/>
               </a:ext>
             </a:extLst>
           </p:cNvPr>
@@ -10742,129 +12102,25 @@
           <p:nvPr/>
         </p:nvPicPr>
         <p:blipFill>
-          <a:blip r:embed="rId2">
-            <a:extLst>
-              <a:ext uri="{28A0092B-C50C-407E-A947-70E740481C1C}">
-                <a14:useLocalDpi xmlns:a14="http://schemas.microsoft.com/office/drawing/2010/main" val="0"/>
-              </a:ext>
-            </a:extLst>
-          </a:blip>
+          <a:blip r:embed="rId2"/>
           <a:stretch>
             <a:fillRect/>
           </a:stretch>
         </p:blipFill>
         <p:spPr>
           <a:xfrm>
-            <a:off x="607801" y="2330840"/>
-            <a:ext cx="4673252" cy="4673252"/>
+            <a:off x="2400300" y="-45118"/>
+            <a:ext cx="7200900" cy="6948236"/>
           </a:xfrm>
           <a:prstGeom prst="rect">
             <a:avLst/>
           </a:prstGeom>
         </p:spPr>
       </p:pic>
-      <p:sp>
-        <p:nvSpPr>
-          <p:cNvPr id="7" name="TextBox 6">
-            <a:extLst>
-              <a:ext uri="{FF2B5EF4-FFF2-40B4-BE49-F238E27FC236}">
-                <a16:creationId xmlns:a16="http://schemas.microsoft.com/office/drawing/2014/main" id="{C7A737D9-7C89-4387-B329-7DD818414DFF}"/>
-              </a:ext>
-            </a:extLst>
-          </p:cNvPr>
-          <p:cNvSpPr txBox="1"/>
-          <p:nvPr/>
-        </p:nvSpPr>
-        <p:spPr>
-          <a:xfrm>
-            <a:off x="4864964" y="2330840"/>
-            <a:ext cx="5671669" cy="3416320"/>
-          </a:xfrm>
-          <a:prstGeom prst="rect">
-            <a:avLst/>
-          </a:prstGeom>
-          <a:noFill/>
-        </p:spPr>
-        <p:txBody>
-          <a:bodyPr wrap="square" rtlCol="0">
-            <a:spAutoFit/>
-          </a:bodyPr>
-          <a:lstStyle/>
-          <a:p>
-            <a:pPr marL="571500" indent="-571500">
-              <a:buFont typeface="Arial" panose="020B0604020202020204" pitchFamily="34" charset="0"/>
-              <a:buChar char="•"/>
-            </a:pPr>
-            <a:r>
-              <a:rPr lang="en-US" sz="3600" dirty="0">
-                <a:solidFill>
-                  <a:schemeClr val="bg1"/>
-                </a:solidFill>
-                <a:latin typeface="The Bold Font" pitchFamily="2" charset="0"/>
-              </a:rPr>
-              <a:t>Done in pairs</a:t>
-            </a:r>
-          </a:p>
-          <a:p>
-            <a:pPr marL="571500" indent="-571500">
-              <a:buFont typeface="Arial" panose="020B0604020202020204" pitchFamily="34" charset="0"/>
-              <a:buChar char="•"/>
-            </a:pPr>
-            <a:endParaRPr lang="en-US" sz="3600" dirty="0">
-              <a:solidFill>
-                <a:schemeClr val="bg1"/>
-              </a:solidFill>
-              <a:latin typeface="The Bold Font" pitchFamily="2" charset="0"/>
-            </a:endParaRPr>
-          </a:p>
-          <a:p>
-            <a:pPr marL="571500" indent="-571500">
-              <a:buFont typeface="Arial" panose="020B0604020202020204" pitchFamily="34" charset="0"/>
-              <a:buChar char="•"/>
-            </a:pPr>
-            <a:r>
-              <a:rPr lang="en-US" sz="3600" dirty="0">
-                <a:solidFill>
-                  <a:schemeClr val="bg1"/>
-                </a:solidFill>
-                <a:latin typeface="The Bold Font" pitchFamily="2" charset="0"/>
-              </a:rPr>
-              <a:t>Performed on parts not made by the pair</a:t>
-            </a:r>
-          </a:p>
-          <a:p>
-            <a:pPr marL="571500" indent="-571500">
-              <a:buFont typeface="Arial" panose="020B0604020202020204" pitchFamily="34" charset="0"/>
-              <a:buChar char="•"/>
-            </a:pPr>
-            <a:endParaRPr lang="en-US" sz="3600" dirty="0">
-              <a:solidFill>
-                <a:schemeClr val="bg1"/>
-              </a:solidFill>
-              <a:latin typeface="The Bold Font" pitchFamily="2" charset="0"/>
-            </a:endParaRPr>
-          </a:p>
-          <a:p>
-            <a:pPr marL="571500" indent="-571500">
-              <a:buFont typeface="Arial" panose="020B0604020202020204" pitchFamily="34" charset="0"/>
-              <a:buChar char="•"/>
-            </a:pPr>
-            <a:r>
-              <a:rPr lang="en-US" sz="3600" dirty="0">
-                <a:solidFill>
-                  <a:schemeClr val="bg1"/>
-                </a:solidFill>
-                <a:latin typeface="The Bold Font" pitchFamily="2" charset="0"/>
-              </a:rPr>
-              <a:t>Application wide</a:t>
-            </a:r>
-          </a:p>
-        </p:txBody>
-      </p:sp>
     </p:spTree>
     <p:extLst>
       <p:ext uri="{BB962C8B-B14F-4D97-AF65-F5344CB8AC3E}">
-        <p14:creationId xmlns:p14="http://schemas.microsoft.com/office/powerpoint/2010/main" val="455917237"/>
+        <p14:creationId xmlns:p14="http://schemas.microsoft.com/office/powerpoint/2010/main" val="4192539334"/>
       </p:ext>
     </p:extLst>
   </p:cSld>
@@ -10891,58 +12147,42 @@
           <a:chExt cx="0" cy="0"/>
         </a:xfrm>
       </p:grpSpPr>
-      <p:sp>
-        <p:nvSpPr>
-          <p:cNvPr id="7" name="Rectangle 6">
+      <p:pic>
+        <p:nvPicPr>
+          <p:cNvPr id="3" name="Picture 2" descr="A close up of a logo&#10;&#10;Description automatically generated">
             <a:extLst>
               <a:ext uri="{FF2B5EF4-FFF2-40B4-BE49-F238E27FC236}">
-                <a16:creationId xmlns:a16="http://schemas.microsoft.com/office/drawing/2014/main" id="{2D7E2373-A9F6-4A38-807D-03D46852DADD}"/>
+                <a16:creationId xmlns:a16="http://schemas.microsoft.com/office/drawing/2014/main" id="{7783D93B-D516-41EB-B138-187FBA2FBE6F}"/>
               </a:ext>
             </a:extLst>
           </p:cNvPr>
-          <p:cNvSpPr/>
+          <p:cNvPicPr>
+            <a:picLocks noChangeAspect="1"/>
+          </p:cNvPicPr>
           <p:nvPr/>
-        </p:nvSpPr>
+        </p:nvPicPr>
+        <p:blipFill>
+          <a:blip r:embed="rId2">
+            <a:extLst>
+              <a:ext uri="{28A0092B-C50C-407E-A947-70E740481C1C}">
+                <a14:useLocalDpi xmlns:a14="http://schemas.microsoft.com/office/drawing/2010/main" val="0"/>
+              </a:ext>
+            </a:extLst>
+          </a:blip>
+          <a:stretch>
+            <a:fillRect/>
+          </a:stretch>
+        </p:blipFill>
         <p:spPr>
           <a:xfrm>
-            <a:off x="2227634" y="0"/>
-            <a:ext cx="9964366" cy="6858000"/>
+            <a:off x="0" y="-106040"/>
+            <a:ext cx="2019300" cy="2019300"/>
           </a:xfrm>
           <a:prstGeom prst="rect">
             <a:avLst/>
           </a:prstGeom>
-          <a:solidFill>
-            <a:srgbClr val="FF8C00"/>
-          </a:solidFill>
-          <a:ln>
-            <a:noFill/>
-          </a:ln>
         </p:spPr>
-        <p:style>
-          <a:lnRef idx="2">
-            <a:schemeClr val="accent1">
-              <a:shade val="50000"/>
-            </a:schemeClr>
-          </a:lnRef>
-          <a:fillRef idx="1">
-            <a:schemeClr val="accent1"/>
-          </a:fillRef>
-          <a:effectRef idx="0">
-            <a:schemeClr val="accent1"/>
-          </a:effectRef>
-          <a:fontRef idx="minor">
-            <a:schemeClr val="lt1"/>
-          </a:fontRef>
-        </p:style>
-        <p:txBody>
-          <a:bodyPr rtlCol="0" anchor="ctr"/>
-          <a:lstStyle/>
-          <a:p>
-            <a:pPr algn="ctr"/>
-            <a:endParaRPr lang="en-US" dirty="0"/>
-          </a:p>
-        </p:txBody>
-      </p:sp>
+      </p:pic>
       <p:sp>
         <p:nvSpPr>
           <p:cNvPr id="5" name="TextBox 4">
@@ -10957,8 +12197,8 @@
         </p:nvSpPr>
         <p:spPr>
           <a:xfrm>
-            <a:off x="1759351" y="170066"/>
-            <a:ext cx="10432649" cy="2092881"/>
+            <a:off x="1535672" y="51212"/>
+            <a:ext cx="10558510" cy="1862048"/>
           </a:xfrm>
           <a:prstGeom prst="rect">
             <a:avLst/>
@@ -10980,23 +12220,23 @@
           <a:p>
             <a:pPr algn="ctr"/>
             <a:r>
-              <a:rPr lang="en-US" sz="13000" dirty="0">
+              <a:rPr lang="en-US" sz="11500" dirty="0">
                 <a:solidFill>
-                  <a:schemeClr val="bg1"/>
+                  <a:srgbClr val="00CED1"/>
                 </a:solidFill>
                 <a:latin typeface="The Bold Font" pitchFamily="2" charset="0"/>
               </a:rPr>
-              <a:t>The future</a:t>
+              <a:t>deliverables</a:t>
             </a:r>
           </a:p>
         </p:txBody>
       </p:sp>
       <p:sp>
         <p:nvSpPr>
-          <p:cNvPr id="6" name="TextBox 5">
+          <p:cNvPr id="7" name="TextBox 6">
             <a:extLst>
               <a:ext uri="{FF2B5EF4-FFF2-40B4-BE49-F238E27FC236}">
-                <a16:creationId xmlns:a16="http://schemas.microsoft.com/office/drawing/2014/main" id="{A49A815F-0ACF-4062-990A-CF1F68002291}"/>
+                <a16:creationId xmlns:a16="http://schemas.microsoft.com/office/drawing/2014/main" id="{C7A737D9-7C89-4387-B329-7DD818414DFF}"/>
               </a:ext>
             </a:extLst>
           </p:cNvPr>
@@ -11005,8 +12245,8 @@
         </p:nvSpPr>
         <p:spPr>
           <a:xfrm>
-            <a:off x="6988614" y="3157768"/>
-            <a:ext cx="5671669" cy="2308324"/>
+            <a:off x="408537" y="3112525"/>
+            <a:ext cx="2952032" cy="1569660"/>
           </a:xfrm>
           <a:prstGeom prst="rect">
             <a:avLst/>
@@ -11019,108 +12259,325 @@
           </a:bodyPr>
           <a:lstStyle/>
           <a:p>
-            <a:pPr marL="571500" indent="-571500">
+            <a:r>
+              <a:rPr lang="en-US" sz="2400" dirty="0">
+                <a:solidFill>
+                  <a:srgbClr val="00B050"/>
+                </a:solidFill>
+                <a:latin typeface="The Bold Font" pitchFamily="2" charset="0"/>
+              </a:rPr>
+              <a:t>Green = delivered</a:t>
+            </a:r>
+            <a:br>
+              <a:rPr lang="en-US" sz="2400" dirty="0">
+                <a:solidFill>
+                  <a:srgbClr val="00CED1"/>
+                </a:solidFill>
+                <a:latin typeface="The Bold Font" pitchFamily="2" charset="0"/>
+              </a:rPr>
+            </a:br>
+            <a:r>
+              <a:rPr lang="en-US" sz="2400" dirty="0">
+                <a:solidFill>
+                  <a:srgbClr val="FF8C00"/>
+                </a:solidFill>
+                <a:latin typeface="The Bold Font" pitchFamily="2" charset="0"/>
+              </a:rPr>
+              <a:t>orange = issues with delivery</a:t>
+            </a:r>
+          </a:p>
+          <a:p>
+            <a:r>
+              <a:rPr lang="en-US" sz="2400" dirty="0">
+                <a:solidFill>
+                  <a:srgbClr val="FF0000"/>
+                </a:solidFill>
+                <a:latin typeface="The Bold Font" pitchFamily="2" charset="0"/>
+              </a:rPr>
+              <a:t>Red = incomplete</a:t>
+            </a:r>
+          </a:p>
+        </p:txBody>
+      </p:sp>
+      <p:sp>
+        <p:nvSpPr>
+          <p:cNvPr id="4" name="Rectangle 3">
+            <a:extLst>
+              <a:ext uri="{FF2B5EF4-FFF2-40B4-BE49-F238E27FC236}">
+                <a16:creationId xmlns:a16="http://schemas.microsoft.com/office/drawing/2014/main" id="{6BD9DB6D-DA56-41A2-BCA6-7C9DD1775A83}"/>
+              </a:ext>
+            </a:extLst>
+          </p:cNvPr>
+          <p:cNvSpPr/>
+          <p:nvPr/>
+        </p:nvSpPr>
+        <p:spPr>
+          <a:xfrm>
+            <a:off x="3840653" y="1913260"/>
+            <a:ext cx="8478603" cy="4801314"/>
+          </a:xfrm>
+          <a:prstGeom prst="rect">
+            <a:avLst/>
+          </a:prstGeom>
+        </p:spPr>
+        <p:txBody>
+          <a:bodyPr wrap="none">
+            <a:spAutoFit/>
+          </a:bodyPr>
+          <a:lstStyle/>
+          <a:p>
+            <a:pPr marL="285750" indent="-285750">
               <a:buFont typeface="Arial" panose="020B0604020202020204" pitchFamily="34" charset="0"/>
               <a:buChar char="•"/>
             </a:pPr>
             <a:r>
-              <a:rPr lang="en-US" sz="3600" dirty="0">
+              <a:rPr lang="en-US" dirty="0">
                 <a:solidFill>
-                  <a:schemeClr val="bg1"/>
+                  <a:srgbClr val="00B050"/>
                 </a:solidFill>
                 <a:latin typeface="The Bold Font" pitchFamily="2" charset="0"/>
               </a:rPr>
-              <a:t>ai</a:t>
+              <a:t>Businesses can upload images for promotions</a:t>
             </a:r>
-          </a:p>
-          <a:p>
-            <a:pPr marL="571500" indent="-571500">
-              <a:buFont typeface="Arial" panose="020B0604020202020204" pitchFamily="34" charset="0"/>
-              <a:buChar char="•"/>
-            </a:pPr>
-            <a:endParaRPr lang="en-US" sz="3600" dirty="0">
+            <a:br>
+              <a:rPr lang="en-US" dirty="0">
+                <a:solidFill>
+                  <a:srgbClr val="00B050"/>
+                </a:solidFill>
+                <a:latin typeface="The Bold Font" pitchFamily="2" charset="0"/>
+              </a:rPr>
+            </a:br>
+            <a:endParaRPr lang="en-US" dirty="0">
               <a:solidFill>
-                <a:schemeClr val="bg1"/>
+                <a:srgbClr val="00B050"/>
               </a:solidFill>
               <a:latin typeface="The Bold Font" pitchFamily="2" charset="0"/>
             </a:endParaRPr>
           </a:p>
           <a:p>
-            <a:pPr marL="571500" indent="-571500">
+            <a:pPr marL="285750" indent="-285750">
               <a:buFont typeface="Arial" panose="020B0604020202020204" pitchFamily="34" charset="0"/>
               <a:buChar char="•"/>
             </a:pPr>
             <a:r>
-              <a:rPr lang="en-US" sz="3600" dirty="0">
+              <a:rPr lang="en-US" dirty="0">
                 <a:solidFill>
-                  <a:schemeClr val="bg1"/>
+                  <a:srgbClr val="00B050"/>
                 </a:solidFill>
                 <a:latin typeface="The Bold Font" pitchFamily="2" charset="0"/>
               </a:rPr>
-              <a:t>Business plan</a:t>
+              <a:t>Monthly </a:t>
             </a:r>
-          </a:p>
-          <a:p>
-            <a:endParaRPr lang="en-US" sz="3600" dirty="0">
+            <a:r>
+              <a:rPr lang="en-US" dirty="0" err="1">
+                <a:solidFill>
+                  <a:srgbClr val="00B050"/>
+                </a:solidFill>
+                <a:latin typeface="The Bold Font" pitchFamily="2" charset="0"/>
+              </a:rPr>
+              <a:t>kpi</a:t>
+            </a:r>
+            <a:r>
+              <a:rPr lang="en-US" dirty="0">
+                <a:solidFill>
+                  <a:srgbClr val="00B050"/>
+                </a:solidFill>
+                <a:latin typeface="The Bold Font" pitchFamily="2" charset="0"/>
+              </a:rPr>
+              <a:t> report for administrator</a:t>
+            </a:r>
+          </a:p>
+          <a:p>
+            <a:pPr marL="285750" indent="-285750">
+              <a:buFont typeface="Arial" panose="020B0604020202020204" pitchFamily="34" charset="0"/>
+              <a:buChar char="•"/>
+            </a:pPr>
+            <a:endParaRPr lang="en-US" dirty="0">
               <a:solidFill>
-                <a:schemeClr val="bg1"/>
+                <a:srgbClr val="00B050"/>
               </a:solidFill>
               <a:latin typeface="The Bold Font" pitchFamily="2" charset="0"/>
             </a:endParaRPr>
           </a:p>
+          <a:p>
+            <a:pPr marL="285750" indent="-285750">
+              <a:buFont typeface="Arial" panose="020B0604020202020204" pitchFamily="34" charset="0"/>
+              <a:buChar char="•"/>
+            </a:pPr>
+            <a:r>
+              <a:rPr lang="en-US" dirty="0">
+                <a:solidFill>
+                  <a:srgbClr val="00B050"/>
+                </a:solidFill>
+                <a:latin typeface="The Bold Font" pitchFamily="2" charset="0"/>
+              </a:rPr>
+              <a:t>Analytics: total visitors/month, new vs. old customers, visitors/tier</a:t>
+            </a:r>
+          </a:p>
+          <a:p>
+            <a:pPr marL="285750" indent="-285750">
+              <a:buFont typeface="Arial" panose="020B0604020202020204" pitchFamily="34" charset="0"/>
+              <a:buChar char="•"/>
+            </a:pPr>
+            <a:endParaRPr lang="en-US" dirty="0">
+              <a:solidFill>
+                <a:srgbClr val="00B050"/>
+              </a:solidFill>
+              <a:latin typeface="The Bold Font" pitchFamily="2" charset="0"/>
+            </a:endParaRPr>
+          </a:p>
+          <a:p>
+            <a:pPr marL="285750" indent="-285750">
+              <a:buFont typeface="Arial" panose="020B0604020202020204" pitchFamily="34" charset="0"/>
+              <a:buChar char="•"/>
+            </a:pPr>
+            <a:r>
+              <a:rPr lang="en-US" dirty="0">
+                <a:solidFill>
+                  <a:srgbClr val="00B050"/>
+                </a:solidFill>
+                <a:latin typeface="The Bold Font" pitchFamily="2" charset="0"/>
+              </a:rPr>
+              <a:t>Administrator component</a:t>
+            </a:r>
+          </a:p>
+          <a:p>
+            <a:pPr marL="285750" indent="-285750">
+              <a:buFont typeface="Arial" panose="020B0604020202020204" pitchFamily="34" charset="0"/>
+              <a:buChar char="•"/>
+            </a:pPr>
+            <a:endParaRPr lang="en-US" dirty="0">
+              <a:solidFill>
+                <a:srgbClr val="00B050"/>
+              </a:solidFill>
+              <a:latin typeface="The Bold Font" pitchFamily="2" charset="0"/>
+            </a:endParaRPr>
+          </a:p>
+          <a:p>
+            <a:pPr marL="285750" indent="-285750">
+              <a:buFont typeface="Arial" panose="020B0604020202020204" pitchFamily="34" charset="0"/>
+              <a:buChar char="•"/>
+            </a:pPr>
+            <a:r>
+              <a:rPr lang="en-US" dirty="0">
+                <a:solidFill>
+                  <a:srgbClr val="00B050"/>
+                </a:solidFill>
+                <a:latin typeface="The Bold Font" pitchFamily="2" charset="0"/>
+              </a:rPr>
+              <a:t>User tiers</a:t>
+            </a:r>
+          </a:p>
+          <a:p>
+            <a:pPr marL="285750" indent="-285750">
+              <a:buFont typeface="Arial" panose="020B0604020202020204" pitchFamily="34" charset="0"/>
+              <a:buChar char="•"/>
+            </a:pPr>
+            <a:endParaRPr lang="en-US" dirty="0">
+              <a:solidFill>
+                <a:srgbClr val="00B050"/>
+              </a:solidFill>
+              <a:latin typeface="The Bold Font" pitchFamily="2" charset="0"/>
+            </a:endParaRPr>
+          </a:p>
+          <a:p>
+            <a:pPr marL="285750" indent="-285750">
+              <a:buFont typeface="Arial" panose="020B0604020202020204" pitchFamily="34" charset="0"/>
+              <a:buChar char="•"/>
+            </a:pPr>
+            <a:r>
+              <a:rPr lang="en-US" dirty="0">
+                <a:solidFill>
+                  <a:srgbClr val="00B050"/>
+                </a:solidFill>
+                <a:latin typeface="The Bold Font" pitchFamily="2" charset="0"/>
+              </a:rPr>
+              <a:t>Miscellaneous visual changes</a:t>
+            </a:r>
+          </a:p>
+          <a:p>
+            <a:pPr marL="285750" indent="-285750">
+              <a:buFont typeface="Arial" panose="020B0604020202020204" pitchFamily="34" charset="0"/>
+              <a:buChar char="•"/>
+            </a:pPr>
+            <a:endParaRPr lang="en-US" dirty="0">
+              <a:solidFill>
+                <a:srgbClr val="00B050"/>
+              </a:solidFill>
+              <a:latin typeface="The Bold Font" pitchFamily="2" charset="0"/>
+            </a:endParaRPr>
+          </a:p>
+          <a:p>
+            <a:pPr marL="285750" indent="-285750">
+              <a:buFont typeface="Arial" panose="020B0604020202020204" pitchFamily="34" charset="0"/>
+              <a:buChar char="•"/>
+            </a:pPr>
+            <a:r>
+              <a:rPr lang="en-US" dirty="0">
+                <a:solidFill>
+                  <a:srgbClr val="00B050"/>
+                </a:solidFill>
+                <a:latin typeface="The Bold Font" pitchFamily="2" charset="0"/>
+              </a:rPr>
+              <a:t>Minor functional changes</a:t>
+            </a:r>
+          </a:p>
+          <a:p>
+            <a:pPr marL="285750" indent="-285750">
+              <a:buFont typeface="Arial" panose="020B0604020202020204" pitchFamily="34" charset="0"/>
+              <a:buChar char="•"/>
+            </a:pPr>
+            <a:endParaRPr lang="en-US" dirty="0">
+              <a:solidFill>
+                <a:srgbClr val="00B050"/>
+              </a:solidFill>
+              <a:latin typeface="The Bold Font" pitchFamily="2" charset="0"/>
+            </a:endParaRPr>
+          </a:p>
+          <a:p>
+            <a:pPr marL="285750" indent="-285750">
+              <a:buFont typeface="Arial" panose="020B0604020202020204" pitchFamily="34" charset="0"/>
+              <a:buChar char="•"/>
+            </a:pPr>
+            <a:r>
+              <a:rPr lang="en-US" dirty="0">
+                <a:solidFill>
+                  <a:srgbClr val="00B050"/>
+                </a:solidFill>
+                <a:latin typeface="The Bold Font" pitchFamily="2" charset="0"/>
+              </a:rPr>
+              <a:t>Aesthetic  update</a:t>
+            </a:r>
+          </a:p>
+          <a:p>
+            <a:pPr marL="285750" indent="-285750">
+              <a:buFont typeface="Arial" panose="020B0604020202020204" pitchFamily="34" charset="0"/>
+              <a:buChar char="•"/>
+            </a:pPr>
+            <a:endParaRPr lang="en-US" dirty="0">
+              <a:solidFill>
+                <a:srgbClr val="00B050"/>
+              </a:solidFill>
+              <a:latin typeface="The Bold Font" pitchFamily="2" charset="0"/>
+            </a:endParaRPr>
+          </a:p>
+          <a:p>
+            <a:r>
+              <a:rPr lang="en-US" dirty="0">
+                <a:solidFill>
+                  <a:srgbClr val="FF8C00"/>
+                </a:solidFill>
+                <a:latin typeface="The Bold Font" pitchFamily="2" charset="0"/>
+              </a:rPr>
+              <a:t>*there are A FEW KNOWN BUGS WITH ITEMS NOT LISTED HERE</a:t>
+            </a:r>
+          </a:p>
         </p:txBody>
       </p:sp>
-      <p:pic>
-        <p:nvPicPr>
-          <p:cNvPr id="3078" name="Picture 6" descr="Image result for brain circuit symbol png">
-            <a:extLst>
-              <a:ext uri="{FF2B5EF4-FFF2-40B4-BE49-F238E27FC236}">
-                <a16:creationId xmlns:a16="http://schemas.microsoft.com/office/drawing/2014/main" id="{0C7F256D-B06D-40E2-BBEB-2F9DDD07EE4E}"/>
-              </a:ext>
-            </a:extLst>
-          </p:cNvPr>
-          <p:cNvPicPr>
-            <a:picLocks noChangeAspect="1" noChangeArrowheads="1"/>
-          </p:cNvPicPr>
-          <p:nvPr/>
-        </p:nvPicPr>
-        <p:blipFill>
-          <a:blip r:embed="rId2">
-            <a:extLst>
-              <a:ext uri="{28A0092B-C50C-407E-A947-70E740481C1C}">
-                <a14:useLocalDpi xmlns:a14="http://schemas.microsoft.com/office/drawing/2010/main" val="0"/>
-              </a:ext>
-            </a:extLst>
-          </a:blip>
-          <a:srcRect/>
-          <a:stretch>
-            <a:fillRect/>
-          </a:stretch>
-        </p:blipFill>
-        <p:spPr bwMode="auto">
-          <a:xfrm>
-            <a:off x="0" y="2028903"/>
-            <a:ext cx="5671668" cy="5132301"/>
-          </a:xfrm>
-          <a:prstGeom prst="rect">
-            <a:avLst/>
-          </a:prstGeom>
-          <a:noFill/>
-          <a:extLst>
-            <a:ext uri="{909E8E84-426E-40DD-AFC4-6F175D3DCCD1}">
-              <a14:hiddenFill xmlns:a14="http://schemas.microsoft.com/office/drawing/2010/main">
-                <a:solidFill>
-                  <a:srgbClr val="FFFFFF"/>
-                </a:solidFill>
-              </a14:hiddenFill>
-            </a:ext>
-          </a:extLst>
-        </p:spPr>
-      </p:pic>
     </p:spTree>
     <p:extLst>
       <p:ext uri="{BB962C8B-B14F-4D97-AF65-F5344CB8AC3E}">
-        <p14:creationId xmlns:p14="http://schemas.microsoft.com/office/powerpoint/2010/main" val="4185682285"/>
+        <p14:creationId xmlns:p14="http://schemas.microsoft.com/office/powerpoint/2010/main" val="4028998512"/>
       </p:ext>
     </p:extLst>
   </p:cSld>

</xml_diff>

<commit_message>
Update 4900 Presentation Group 9.pptx
</commit_message>
<xml_diff>
--- a/Phase 2 Hand-in/4900 Presentation Group 9.pptx
+++ b/Phase 2 Hand-in/4900 Presentation Group 9.pptx
@@ -17,8 +17,8 @@
     <p:sldId id="275" r:id="rId8"/>
     <p:sldId id="276" r:id="rId9"/>
     <p:sldId id="265" r:id="rId10"/>
-    <p:sldId id="264" r:id="rId11"/>
-    <p:sldId id="266" r:id="rId12"/>
+    <p:sldId id="266" r:id="rId11"/>
+    <p:sldId id="264" r:id="rId12"/>
     <p:sldId id="274" r:id="rId13"/>
     <p:sldId id="270" r:id="rId14"/>
     <p:sldId id="271" r:id="rId15"/>
@@ -8704,6 +8704,338 @@
           <a:chExt cx="0" cy="0"/>
         </a:xfrm>
       </p:grpSpPr>
+      <p:graphicFrame>
+        <p:nvGraphicFramePr>
+          <p:cNvPr id="6" name="Chart 5">
+            <a:extLst>
+              <a:ext uri="{FF2B5EF4-FFF2-40B4-BE49-F238E27FC236}">
+                <a16:creationId xmlns:a16="http://schemas.microsoft.com/office/drawing/2014/main" id="{33095550-E1B8-4AFA-B583-BC6CE984827F}"/>
+              </a:ext>
+            </a:extLst>
+          </p:cNvPr>
+          <p:cNvGraphicFramePr/>
+          <p:nvPr>
+            <p:extLst>
+              <p:ext uri="{D42A27DB-BD31-4B8C-83A1-F6EECF244321}">
+                <p14:modId xmlns:p14="http://schemas.microsoft.com/office/powerpoint/2010/main" val="267835541"/>
+              </p:ext>
+            </p:extLst>
+          </p:nvPr>
+        </p:nvGraphicFramePr>
+        <p:xfrm>
+          <a:off x="-653186" y="3238501"/>
+          <a:ext cx="6749185" cy="3663706"/>
+        </p:xfrm>
+        <a:graphic>
+          <a:graphicData uri="http://schemas.openxmlformats.org/drawingml/2006/chart">
+            <c:chart xmlns:c="http://schemas.openxmlformats.org/drawingml/2006/chart" xmlns:r="http://schemas.openxmlformats.org/officeDocument/2006/relationships" r:id="rId2"/>
+          </a:graphicData>
+        </a:graphic>
+      </p:graphicFrame>
+      <p:graphicFrame>
+        <p:nvGraphicFramePr>
+          <p:cNvPr id="9" name="Chart 8">
+            <a:extLst>
+              <a:ext uri="{FF2B5EF4-FFF2-40B4-BE49-F238E27FC236}">
+                <a16:creationId xmlns:a16="http://schemas.microsoft.com/office/drawing/2014/main" id="{4874C84F-3506-4390-90C3-0285C37240DE}"/>
+              </a:ext>
+            </a:extLst>
+          </p:cNvPr>
+          <p:cNvGraphicFramePr/>
+          <p:nvPr>
+            <p:extLst>
+              <p:ext uri="{D42A27DB-BD31-4B8C-83A1-F6EECF244321}">
+                <p14:modId xmlns:p14="http://schemas.microsoft.com/office/powerpoint/2010/main" val="355822873"/>
+              </p:ext>
+            </p:extLst>
+          </p:nvPr>
+        </p:nvGraphicFramePr>
+        <p:xfrm>
+          <a:off x="5800725" y="0"/>
+          <a:ext cx="6358909" cy="3533775"/>
+        </p:xfrm>
+        <a:graphic>
+          <a:graphicData uri="http://schemas.openxmlformats.org/drawingml/2006/chart">
+            <c:chart xmlns:c="http://schemas.openxmlformats.org/drawingml/2006/chart" xmlns:r="http://schemas.openxmlformats.org/officeDocument/2006/relationships" r:id="rId3"/>
+          </a:graphicData>
+        </a:graphic>
+      </p:graphicFrame>
+      <p:graphicFrame>
+        <p:nvGraphicFramePr>
+          <p:cNvPr id="10" name="Chart 9">
+            <a:extLst>
+              <a:ext uri="{FF2B5EF4-FFF2-40B4-BE49-F238E27FC236}">
+                <a16:creationId xmlns:a16="http://schemas.microsoft.com/office/drawing/2014/main" id="{ACE6EA53-DB32-4CAD-BF9B-68AE6D34FFCE}"/>
+              </a:ext>
+            </a:extLst>
+          </p:cNvPr>
+          <p:cNvGraphicFramePr/>
+          <p:nvPr>
+            <p:extLst>
+              <p:ext uri="{D42A27DB-BD31-4B8C-83A1-F6EECF244321}">
+                <p14:modId xmlns:p14="http://schemas.microsoft.com/office/powerpoint/2010/main" val="2797030623"/>
+              </p:ext>
+            </p:extLst>
+          </p:nvPr>
+        </p:nvGraphicFramePr>
+        <p:xfrm>
+          <a:off x="-243856" y="0"/>
+          <a:ext cx="5796439" cy="3533775"/>
+        </p:xfrm>
+        <a:graphic>
+          <a:graphicData uri="http://schemas.openxmlformats.org/drawingml/2006/chart">
+            <c:chart xmlns:c="http://schemas.openxmlformats.org/drawingml/2006/chart" xmlns:r="http://schemas.openxmlformats.org/officeDocument/2006/relationships" r:id="rId4"/>
+          </a:graphicData>
+        </a:graphic>
+      </p:graphicFrame>
+      <p:graphicFrame>
+        <p:nvGraphicFramePr>
+          <p:cNvPr id="11" name="Chart 10">
+            <a:extLst>
+              <a:ext uri="{FF2B5EF4-FFF2-40B4-BE49-F238E27FC236}">
+                <a16:creationId xmlns:a16="http://schemas.microsoft.com/office/drawing/2014/main" id="{32CE0E7C-0504-4485-9BA7-070B8992CB77}"/>
+              </a:ext>
+            </a:extLst>
+          </p:cNvPr>
+          <p:cNvGraphicFramePr/>
+          <p:nvPr>
+            <p:extLst>
+              <p:ext uri="{D42A27DB-BD31-4B8C-83A1-F6EECF244321}">
+                <p14:modId xmlns:p14="http://schemas.microsoft.com/office/powerpoint/2010/main" val="3969690076"/>
+              </p:ext>
+            </p:extLst>
+          </p:nvPr>
+        </p:nvGraphicFramePr>
+        <p:xfrm>
+          <a:off x="5800725" y="3238501"/>
+          <a:ext cx="6503173" cy="3663706"/>
+        </p:xfrm>
+        <a:graphic>
+          <a:graphicData uri="http://schemas.openxmlformats.org/drawingml/2006/chart">
+            <c:chart xmlns:c="http://schemas.openxmlformats.org/drawingml/2006/chart" xmlns:r="http://schemas.openxmlformats.org/officeDocument/2006/relationships" r:id="rId5"/>
+          </a:graphicData>
+        </a:graphic>
+      </p:graphicFrame>
+      <p:sp>
+        <p:nvSpPr>
+          <p:cNvPr id="14" name="TextBox 13">
+            <a:extLst>
+              <a:ext uri="{FF2B5EF4-FFF2-40B4-BE49-F238E27FC236}">
+                <a16:creationId xmlns:a16="http://schemas.microsoft.com/office/drawing/2014/main" id="{4532E0AB-B2B4-4D37-A10E-CEDA67DE14E0}"/>
+              </a:ext>
+            </a:extLst>
+          </p:cNvPr>
+          <p:cNvSpPr txBox="1"/>
+          <p:nvPr/>
+        </p:nvSpPr>
+        <p:spPr>
+          <a:xfrm>
+            <a:off x="4733925" y="1965709"/>
+            <a:ext cx="2724150" cy="3046988"/>
+          </a:xfrm>
+          <a:prstGeom prst="rect">
+            <a:avLst/>
+          </a:prstGeom>
+          <a:noFill/>
+        </p:spPr>
+        <p:txBody>
+          <a:bodyPr wrap="square" rtlCol="0">
+            <a:spAutoFit/>
+          </a:bodyPr>
+          <a:lstStyle/>
+          <a:p>
+            <a:pPr algn="ctr"/>
+            <a:r>
+              <a:rPr lang="en-US" sz="2400" dirty="0">
+                <a:solidFill>
+                  <a:srgbClr val="0070C0"/>
+                </a:solidFill>
+                <a:latin typeface="The Bold Font" pitchFamily="2" charset="0"/>
+              </a:rPr>
+              <a:t>UI</a:t>
+            </a:r>
+          </a:p>
+          <a:p>
+            <a:pPr algn="ctr"/>
+            <a:r>
+              <a:rPr lang="en-US" sz="2400" dirty="0">
+                <a:solidFill>
+                  <a:srgbClr val="FF8C00"/>
+                </a:solidFill>
+                <a:latin typeface="The Bold Font" pitchFamily="2" charset="0"/>
+              </a:rPr>
+              <a:t>ADMIN</a:t>
+            </a:r>
+          </a:p>
+          <a:p>
+            <a:pPr algn="ctr"/>
+            <a:r>
+              <a:rPr lang="en-US" sz="2400" dirty="0">
+                <a:solidFill>
+                  <a:schemeClr val="bg1">
+                    <a:lumMod val="50000"/>
+                  </a:schemeClr>
+                </a:solidFill>
+                <a:latin typeface="The Bold Font" pitchFamily="2" charset="0"/>
+              </a:rPr>
+              <a:t>USER</a:t>
+            </a:r>
+          </a:p>
+          <a:p>
+            <a:pPr algn="ctr"/>
+            <a:r>
+              <a:rPr lang="en-US" sz="2400" dirty="0">
+                <a:solidFill>
+                  <a:srgbClr val="FFC000"/>
+                </a:solidFill>
+                <a:latin typeface="The Bold Font" pitchFamily="2" charset="0"/>
+              </a:rPr>
+              <a:t>BUSINESS</a:t>
+            </a:r>
+          </a:p>
+          <a:p>
+            <a:pPr algn="ctr"/>
+            <a:r>
+              <a:rPr lang="en-US" sz="2400" dirty="0">
+                <a:solidFill>
+                  <a:schemeClr val="accent1">
+                    <a:lumMod val="60000"/>
+                    <a:lumOff val="40000"/>
+                  </a:schemeClr>
+                </a:solidFill>
+                <a:latin typeface="The Bold Font" pitchFamily="2" charset="0"/>
+              </a:rPr>
+              <a:t>DATABASE</a:t>
+            </a:r>
+          </a:p>
+          <a:p>
+            <a:pPr algn="ctr"/>
+            <a:r>
+              <a:rPr lang="en-US" sz="2400" dirty="0">
+                <a:solidFill>
+                  <a:schemeClr val="accent6">
+                    <a:lumMod val="75000"/>
+                  </a:schemeClr>
+                </a:solidFill>
+                <a:latin typeface="The Bold Font" pitchFamily="2" charset="0"/>
+              </a:rPr>
+              <a:t>ANALYTICS</a:t>
+            </a:r>
+          </a:p>
+          <a:p>
+            <a:pPr algn="ctr"/>
+            <a:r>
+              <a:rPr lang="en-US" sz="2400" dirty="0">
+                <a:solidFill>
+                  <a:schemeClr val="accent1">
+                    <a:lumMod val="75000"/>
+                  </a:schemeClr>
+                </a:solidFill>
+                <a:latin typeface="The Bold Font" pitchFamily="2" charset="0"/>
+              </a:rPr>
+              <a:t>AI</a:t>
+            </a:r>
+          </a:p>
+          <a:p>
+            <a:pPr algn="ctr"/>
+            <a:r>
+              <a:rPr lang="en-US" sz="2400" dirty="0">
+                <a:solidFill>
+                  <a:schemeClr val="accent2">
+                    <a:lumMod val="50000"/>
+                  </a:schemeClr>
+                </a:solidFill>
+                <a:latin typeface="The Bold Font" pitchFamily="2" charset="0"/>
+              </a:rPr>
+              <a:t>DOCUMENTATION</a:t>
+            </a:r>
+          </a:p>
+        </p:txBody>
+      </p:sp>
+      <p:sp>
+        <p:nvSpPr>
+          <p:cNvPr id="15" name="TextBox 14">
+            <a:extLst>
+              <a:ext uri="{FF2B5EF4-FFF2-40B4-BE49-F238E27FC236}">
+                <a16:creationId xmlns:a16="http://schemas.microsoft.com/office/drawing/2014/main" id="{15A3D418-A7DC-477D-A923-ADB66945748F}"/>
+              </a:ext>
+            </a:extLst>
+          </p:cNvPr>
+          <p:cNvSpPr txBox="1"/>
+          <p:nvPr/>
+        </p:nvSpPr>
+        <p:spPr>
+          <a:xfrm>
+            <a:off x="2654363" y="103661"/>
+            <a:ext cx="6676010" cy="1862048"/>
+          </a:xfrm>
+          <a:prstGeom prst="rect">
+            <a:avLst/>
+          </a:prstGeom>
+          <a:noFill/>
+          <a:effectLst>
+            <a:outerShdw blurRad="50800" dist="38100" algn="l" rotWithShape="0">
+              <a:prstClr val="black">
+                <a:alpha val="40000"/>
+              </a:prstClr>
+            </a:outerShdw>
+          </a:effectLst>
+        </p:spPr>
+        <p:txBody>
+          <a:bodyPr wrap="square" rtlCol="0">
+            <a:spAutoFit/>
+          </a:bodyPr>
+          <a:lstStyle/>
+          <a:p>
+            <a:pPr algn="ctr"/>
+            <a:r>
+              <a:rPr lang="en-US" sz="11500" dirty="0" err="1">
+                <a:solidFill>
+                  <a:srgbClr val="00CED1"/>
+                </a:solidFill>
+                <a:latin typeface="The Bold Font" pitchFamily="2" charset="0"/>
+              </a:rPr>
+              <a:t>wbs</a:t>
+            </a:r>
+            <a:endParaRPr lang="en-US" sz="11500" dirty="0">
+              <a:solidFill>
+                <a:srgbClr val="00CED1"/>
+              </a:solidFill>
+              <a:latin typeface="The Bold Font" pitchFamily="2" charset="0"/>
+            </a:endParaRPr>
+          </a:p>
+        </p:txBody>
+      </p:sp>
+    </p:spTree>
+    <p:extLst>
+      <p:ext uri="{BB962C8B-B14F-4D97-AF65-F5344CB8AC3E}">
+        <p14:creationId xmlns:p14="http://schemas.microsoft.com/office/powerpoint/2010/main" val="1743122752"/>
+      </p:ext>
+    </p:extLst>
+  </p:cSld>
+  <p:clrMapOvr>
+    <a:masterClrMapping/>
+  </p:clrMapOvr>
+</p:sld>
+</file>
+
+<file path=ppt/slides/slide11.xml><?xml version="1.0" encoding="utf-8"?>
+<p:sld xmlns:a="http://schemas.openxmlformats.org/drawingml/2006/main" xmlns:r="http://schemas.openxmlformats.org/officeDocument/2006/relationships" xmlns:p="http://schemas.openxmlformats.org/presentationml/2006/main">
+  <p:cSld>
+    <p:spTree>
+      <p:nvGrpSpPr>
+        <p:cNvPr id="1" name=""/>
+        <p:cNvGrpSpPr/>
+        <p:nvPr/>
+      </p:nvGrpSpPr>
+      <p:grpSpPr>
+        <a:xfrm>
+          <a:off x="0" y="0"/>
+          <a:ext cx="0" cy="0"/>
+          <a:chOff x="0" y="0"/>
+          <a:chExt cx="0" cy="0"/>
+        </a:xfrm>
+      </p:grpSpPr>
       <p:sp>
         <p:nvSpPr>
           <p:cNvPr id="9" name="Rectangle 8">
@@ -8978,338 +9310,6 @@
 </p:sld>
 </file>
 
-<file path=ppt/slides/slide11.xml><?xml version="1.0" encoding="utf-8"?>
-<p:sld xmlns:a="http://schemas.openxmlformats.org/drawingml/2006/main" xmlns:r="http://schemas.openxmlformats.org/officeDocument/2006/relationships" xmlns:p="http://schemas.openxmlformats.org/presentationml/2006/main">
-  <p:cSld>
-    <p:spTree>
-      <p:nvGrpSpPr>
-        <p:cNvPr id="1" name=""/>
-        <p:cNvGrpSpPr/>
-        <p:nvPr/>
-      </p:nvGrpSpPr>
-      <p:grpSpPr>
-        <a:xfrm>
-          <a:off x="0" y="0"/>
-          <a:ext cx="0" cy="0"/>
-          <a:chOff x="0" y="0"/>
-          <a:chExt cx="0" cy="0"/>
-        </a:xfrm>
-      </p:grpSpPr>
-      <p:graphicFrame>
-        <p:nvGraphicFramePr>
-          <p:cNvPr id="6" name="Chart 5">
-            <a:extLst>
-              <a:ext uri="{FF2B5EF4-FFF2-40B4-BE49-F238E27FC236}">
-                <a16:creationId xmlns:a16="http://schemas.microsoft.com/office/drawing/2014/main" id="{33095550-E1B8-4AFA-B583-BC6CE984827F}"/>
-              </a:ext>
-            </a:extLst>
-          </p:cNvPr>
-          <p:cNvGraphicFramePr/>
-          <p:nvPr>
-            <p:extLst>
-              <p:ext uri="{D42A27DB-BD31-4B8C-83A1-F6EECF244321}">
-                <p14:modId xmlns:p14="http://schemas.microsoft.com/office/powerpoint/2010/main" val="267835541"/>
-              </p:ext>
-            </p:extLst>
-          </p:nvPr>
-        </p:nvGraphicFramePr>
-        <p:xfrm>
-          <a:off x="-653186" y="3238501"/>
-          <a:ext cx="6749185" cy="3663706"/>
-        </p:xfrm>
-        <a:graphic>
-          <a:graphicData uri="http://schemas.openxmlformats.org/drawingml/2006/chart">
-            <c:chart xmlns:c="http://schemas.openxmlformats.org/drawingml/2006/chart" xmlns:r="http://schemas.openxmlformats.org/officeDocument/2006/relationships" r:id="rId2"/>
-          </a:graphicData>
-        </a:graphic>
-      </p:graphicFrame>
-      <p:graphicFrame>
-        <p:nvGraphicFramePr>
-          <p:cNvPr id="9" name="Chart 8">
-            <a:extLst>
-              <a:ext uri="{FF2B5EF4-FFF2-40B4-BE49-F238E27FC236}">
-                <a16:creationId xmlns:a16="http://schemas.microsoft.com/office/drawing/2014/main" id="{4874C84F-3506-4390-90C3-0285C37240DE}"/>
-              </a:ext>
-            </a:extLst>
-          </p:cNvPr>
-          <p:cNvGraphicFramePr/>
-          <p:nvPr>
-            <p:extLst>
-              <p:ext uri="{D42A27DB-BD31-4B8C-83A1-F6EECF244321}">
-                <p14:modId xmlns:p14="http://schemas.microsoft.com/office/powerpoint/2010/main" val="355822873"/>
-              </p:ext>
-            </p:extLst>
-          </p:nvPr>
-        </p:nvGraphicFramePr>
-        <p:xfrm>
-          <a:off x="5800725" y="0"/>
-          <a:ext cx="6358909" cy="3533775"/>
-        </p:xfrm>
-        <a:graphic>
-          <a:graphicData uri="http://schemas.openxmlformats.org/drawingml/2006/chart">
-            <c:chart xmlns:c="http://schemas.openxmlformats.org/drawingml/2006/chart" xmlns:r="http://schemas.openxmlformats.org/officeDocument/2006/relationships" r:id="rId3"/>
-          </a:graphicData>
-        </a:graphic>
-      </p:graphicFrame>
-      <p:graphicFrame>
-        <p:nvGraphicFramePr>
-          <p:cNvPr id="10" name="Chart 9">
-            <a:extLst>
-              <a:ext uri="{FF2B5EF4-FFF2-40B4-BE49-F238E27FC236}">
-                <a16:creationId xmlns:a16="http://schemas.microsoft.com/office/drawing/2014/main" id="{ACE6EA53-DB32-4CAD-BF9B-68AE6D34FFCE}"/>
-              </a:ext>
-            </a:extLst>
-          </p:cNvPr>
-          <p:cNvGraphicFramePr/>
-          <p:nvPr>
-            <p:extLst>
-              <p:ext uri="{D42A27DB-BD31-4B8C-83A1-F6EECF244321}">
-                <p14:modId xmlns:p14="http://schemas.microsoft.com/office/powerpoint/2010/main" val="2797030623"/>
-              </p:ext>
-            </p:extLst>
-          </p:nvPr>
-        </p:nvGraphicFramePr>
-        <p:xfrm>
-          <a:off x="-243856" y="0"/>
-          <a:ext cx="5796439" cy="3533775"/>
-        </p:xfrm>
-        <a:graphic>
-          <a:graphicData uri="http://schemas.openxmlformats.org/drawingml/2006/chart">
-            <c:chart xmlns:c="http://schemas.openxmlformats.org/drawingml/2006/chart" xmlns:r="http://schemas.openxmlformats.org/officeDocument/2006/relationships" r:id="rId4"/>
-          </a:graphicData>
-        </a:graphic>
-      </p:graphicFrame>
-      <p:graphicFrame>
-        <p:nvGraphicFramePr>
-          <p:cNvPr id="11" name="Chart 10">
-            <a:extLst>
-              <a:ext uri="{FF2B5EF4-FFF2-40B4-BE49-F238E27FC236}">
-                <a16:creationId xmlns:a16="http://schemas.microsoft.com/office/drawing/2014/main" id="{32CE0E7C-0504-4485-9BA7-070B8992CB77}"/>
-              </a:ext>
-            </a:extLst>
-          </p:cNvPr>
-          <p:cNvGraphicFramePr/>
-          <p:nvPr>
-            <p:extLst>
-              <p:ext uri="{D42A27DB-BD31-4B8C-83A1-F6EECF244321}">
-                <p14:modId xmlns:p14="http://schemas.microsoft.com/office/powerpoint/2010/main" val="3969690076"/>
-              </p:ext>
-            </p:extLst>
-          </p:nvPr>
-        </p:nvGraphicFramePr>
-        <p:xfrm>
-          <a:off x="5800725" y="3238501"/>
-          <a:ext cx="6503173" cy="3663706"/>
-        </p:xfrm>
-        <a:graphic>
-          <a:graphicData uri="http://schemas.openxmlformats.org/drawingml/2006/chart">
-            <c:chart xmlns:c="http://schemas.openxmlformats.org/drawingml/2006/chart" xmlns:r="http://schemas.openxmlformats.org/officeDocument/2006/relationships" r:id="rId5"/>
-          </a:graphicData>
-        </a:graphic>
-      </p:graphicFrame>
-      <p:sp>
-        <p:nvSpPr>
-          <p:cNvPr id="14" name="TextBox 13">
-            <a:extLst>
-              <a:ext uri="{FF2B5EF4-FFF2-40B4-BE49-F238E27FC236}">
-                <a16:creationId xmlns:a16="http://schemas.microsoft.com/office/drawing/2014/main" id="{4532E0AB-B2B4-4D37-A10E-CEDA67DE14E0}"/>
-              </a:ext>
-            </a:extLst>
-          </p:cNvPr>
-          <p:cNvSpPr txBox="1"/>
-          <p:nvPr/>
-        </p:nvSpPr>
-        <p:spPr>
-          <a:xfrm>
-            <a:off x="4733925" y="1965709"/>
-            <a:ext cx="2724150" cy="3046988"/>
-          </a:xfrm>
-          <a:prstGeom prst="rect">
-            <a:avLst/>
-          </a:prstGeom>
-          <a:noFill/>
-        </p:spPr>
-        <p:txBody>
-          <a:bodyPr wrap="square" rtlCol="0">
-            <a:spAutoFit/>
-          </a:bodyPr>
-          <a:lstStyle/>
-          <a:p>
-            <a:pPr algn="ctr"/>
-            <a:r>
-              <a:rPr lang="en-US" sz="2400" dirty="0">
-                <a:solidFill>
-                  <a:srgbClr val="0070C0"/>
-                </a:solidFill>
-                <a:latin typeface="The Bold Font" pitchFamily="2" charset="0"/>
-              </a:rPr>
-              <a:t>UI</a:t>
-            </a:r>
-          </a:p>
-          <a:p>
-            <a:pPr algn="ctr"/>
-            <a:r>
-              <a:rPr lang="en-US" sz="2400" dirty="0">
-                <a:solidFill>
-                  <a:srgbClr val="FF8C00"/>
-                </a:solidFill>
-                <a:latin typeface="The Bold Font" pitchFamily="2" charset="0"/>
-              </a:rPr>
-              <a:t>ADMIN</a:t>
-            </a:r>
-          </a:p>
-          <a:p>
-            <a:pPr algn="ctr"/>
-            <a:r>
-              <a:rPr lang="en-US" sz="2400" dirty="0">
-                <a:solidFill>
-                  <a:schemeClr val="bg1">
-                    <a:lumMod val="50000"/>
-                  </a:schemeClr>
-                </a:solidFill>
-                <a:latin typeface="The Bold Font" pitchFamily="2" charset="0"/>
-              </a:rPr>
-              <a:t>USER</a:t>
-            </a:r>
-          </a:p>
-          <a:p>
-            <a:pPr algn="ctr"/>
-            <a:r>
-              <a:rPr lang="en-US" sz="2400" dirty="0">
-                <a:solidFill>
-                  <a:srgbClr val="FFC000"/>
-                </a:solidFill>
-                <a:latin typeface="The Bold Font" pitchFamily="2" charset="0"/>
-              </a:rPr>
-              <a:t>BUSINESS</a:t>
-            </a:r>
-          </a:p>
-          <a:p>
-            <a:pPr algn="ctr"/>
-            <a:r>
-              <a:rPr lang="en-US" sz="2400" dirty="0">
-                <a:solidFill>
-                  <a:schemeClr val="accent1">
-                    <a:lumMod val="60000"/>
-                    <a:lumOff val="40000"/>
-                  </a:schemeClr>
-                </a:solidFill>
-                <a:latin typeface="The Bold Font" pitchFamily="2" charset="0"/>
-              </a:rPr>
-              <a:t>DATABASE</a:t>
-            </a:r>
-          </a:p>
-          <a:p>
-            <a:pPr algn="ctr"/>
-            <a:r>
-              <a:rPr lang="en-US" sz="2400" dirty="0">
-                <a:solidFill>
-                  <a:schemeClr val="accent6">
-                    <a:lumMod val="75000"/>
-                  </a:schemeClr>
-                </a:solidFill>
-                <a:latin typeface="The Bold Font" pitchFamily="2" charset="0"/>
-              </a:rPr>
-              <a:t>ANALYTICS</a:t>
-            </a:r>
-          </a:p>
-          <a:p>
-            <a:pPr algn="ctr"/>
-            <a:r>
-              <a:rPr lang="en-US" sz="2400" dirty="0">
-                <a:solidFill>
-                  <a:schemeClr val="accent1">
-                    <a:lumMod val="75000"/>
-                  </a:schemeClr>
-                </a:solidFill>
-                <a:latin typeface="The Bold Font" pitchFamily="2" charset="0"/>
-              </a:rPr>
-              <a:t>AI</a:t>
-            </a:r>
-          </a:p>
-          <a:p>
-            <a:pPr algn="ctr"/>
-            <a:r>
-              <a:rPr lang="en-US" sz="2400" dirty="0">
-                <a:solidFill>
-                  <a:schemeClr val="accent2">
-                    <a:lumMod val="50000"/>
-                  </a:schemeClr>
-                </a:solidFill>
-                <a:latin typeface="The Bold Font" pitchFamily="2" charset="0"/>
-              </a:rPr>
-              <a:t>DOCUMENTATION</a:t>
-            </a:r>
-          </a:p>
-        </p:txBody>
-      </p:sp>
-      <p:sp>
-        <p:nvSpPr>
-          <p:cNvPr id="15" name="TextBox 14">
-            <a:extLst>
-              <a:ext uri="{FF2B5EF4-FFF2-40B4-BE49-F238E27FC236}">
-                <a16:creationId xmlns:a16="http://schemas.microsoft.com/office/drawing/2014/main" id="{15A3D418-A7DC-477D-A923-ADB66945748F}"/>
-              </a:ext>
-            </a:extLst>
-          </p:cNvPr>
-          <p:cNvSpPr txBox="1"/>
-          <p:nvPr/>
-        </p:nvSpPr>
-        <p:spPr>
-          <a:xfrm>
-            <a:off x="2654363" y="103661"/>
-            <a:ext cx="6676010" cy="1862048"/>
-          </a:xfrm>
-          <a:prstGeom prst="rect">
-            <a:avLst/>
-          </a:prstGeom>
-          <a:noFill/>
-          <a:effectLst>
-            <a:outerShdw blurRad="50800" dist="38100" algn="l" rotWithShape="0">
-              <a:prstClr val="black">
-                <a:alpha val="40000"/>
-              </a:prstClr>
-            </a:outerShdw>
-          </a:effectLst>
-        </p:spPr>
-        <p:txBody>
-          <a:bodyPr wrap="square" rtlCol="0">
-            <a:spAutoFit/>
-          </a:bodyPr>
-          <a:lstStyle/>
-          <a:p>
-            <a:pPr algn="ctr"/>
-            <a:r>
-              <a:rPr lang="en-US" sz="11500" dirty="0" err="1">
-                <a:solidFill>
-                  <a:srgbClr val="00CED1"/>
-                </a:solidFill>
-                <a:latin typeface="The Bold Font" pitchFamily="2" charset="0"/>
-              </a:rPr>
-              <a:t>wbs</a:t>
-            </a:r>
-            <a:endParaRPr lang="en-US" sz="11500" dirty="0">
-              <a:solidFill>
-                <a:srgbClr val="00CED1"/>
-              </a:solidFill>
-              <a:latin typeface="The Bold Font" pitchFamily="2" charset="0"/>
-            </a:endParaRPr>
-          </a:p>
-        </p:txBody>
-      </p:sp>
-    </p:spTree>
-    <p:extLst>
-      <p:ext uri="{BB962C8B-B14F-4D97-AF65-F5344CB8AC3E}">
-        <p14:creationId xmlns:p14="http://schemas.microsoft.com/office/powerpoint/2010/main" val="1743122752"/>
-      </p:ext>
-    </p:extLst>
-  </p:cSld>
-  <p:clrMapOvr>
-    <a:masterClrMapping/>
-  </p:clrMapOvr>
-</p:sld>
-</file>
-
 <file path=ppt/slides/slide12.xml><?xml version="1.0" encoding="utf-8"?>
 <p:sld xmlns:a="http://schemas.openxmlformats.org/drawingml/2006/main" xmlns:r="http://schemas.openxmlformats.org/officeDocument/2006/relationships" xmlns:p="http://schemas.openxmlformats.org/presentationml/2006/main">
   <p:cSld>
@@ -9440,13 +9440,13 @@
           <p:nvPr>
             <p:extLst>
               <p:ext uri="{D42A27DB-BD31-4B8C-83A1-F6EECF244321}">
-                <p14:modId xmlns:p14="http://schemas.microsoft.com/office/powerpoint/2010/main" val="562608861"/>
+                <p14:modId xmlns:p14="http://schemas.microsoft.com/office/powerpoint/2010/main" val="958440323"/>
               </p:ext>
             </p:extLst>
           </p:nvPr>
         </p:nvGraphicFramePr>
         <p:xfrm>
-          <a:off x="208715" y="1439333"/>
+          <a:off x="190054" y="1336696"/>
           <a:ext cx="8128000" cy="5418667"/>
         </p:xfrm>
         <a:graphic>
@@ -9500,7 +9500,7 @@
         <p:spPr>
           <a:xfrm>
             <a:off x="0" y="0"/>
-            <a:ext cx="10486417" cy="6858000"/>
+            <a:ext cx="9069355" cy="6858000"/>
           </a:xfrm>
           <a:prstGeom prst="rect">
             <a:avLst/>
@@ -12023,10 +12023,10 @@
       </p:grpSpPr>
       <p:pic>
         <p:nvPicPr>
-          <p:cNvPr id="2" name="Picture 1">
+          <p:cNvPr id="3" name="Picture 2">
             <a:extLst>
               <a:ext uri="{FF2B5EF4-FFF2-40B4-BE49-F238E27FC236}">
-                <a16:creationId xmlns:a16="http://schemas.microsoft.com/office/drawing/2014/main" id="{710A4D0E-835C-4917-A7B4-3A680942E627}"/>
+                <a16:creationId xmlns:a16="http://schemas.microsoft.com/office/drawing/2014/main" id="{AD3C8476-38CD-467C-A008-E77329BF7BE8}"/>
               </a:ext>
             </a:extLst>
           </p:cNvPr>
@@ -12043,8 +12043,8 @@
         </p:blipFill>
         <p:spPr>
           <a:xfrm>
-            <a:off x="2400300" y="-45118"/>
-            <a:ext cx="7200900" cy="6948236"/>
+            <a:off x="2630153" y="312569"/>
+            <a:ext cx="6626142" cy="6351957"/>
           </a:xfrm>
           <a:prstGeom prst="rect">
             <a:avLst/>

</xml_diff>